<commit_message>
Added to Javascript slide 2 & moved Python App to be included with JSON, also added OpenWeatherAPI as a source and in the city measures added Temperature
</commit_message>
<xml_diff>
--- a/Homies City Collection.pptx
+++ b/Homies City Collection.pptx
@@ -5,7 +5,7 @@
     <p:sldMasterId id="2147483659" r:id="rId1"/>
   </p:sldMasterIdLst>
   <p:notesMasterIdLst>
-    <p:notesMasterId r:id="rId22"/>
+    <p:notesMasterId r:id="rId21"/>
   </p:notesMasterIdLst>
   <p:sldIdLst>
     <p:sldId id="256" r:id="rId2"/>
@@ -22,29 +22,28 @@
     <p:sldId id="267" r:id="rId13"/>
     <p:sldId id="268" r:id="rId14"/>
     <p:sldId id="269" r:id="rId15"/>
-    <p:sldId id="270" r:id="rId16"/>
-    <p:sldId id="271" r:id="rId17"/>
-    <p:sldId id="272" r:id="rId18"/>
-    <p:sldId id="275" r:id="rId19"/>
-    <p:sldId id="273" r:id="rId20"/>
-    <p:sldId id="274" r:id="rId21"/>
+    <p:sldId id="271" r:id="rId16"/>
+    <p:sldId id="272" r:id="rId17"/>
+    <p:sldId id="275" r:id="rId18"/>
+    <p:sldId id="273" r:id="rId19"/>
+    <p:sldId id="274" r:id="rId20"/>
   </p:sldIdLst>
   <p:sldSz cx="9144000" cy="5143500" type="screen16x9"/>
   <p:notesSz cx="6858000" cy="9144000"/>
   <p:embeddedFontLst>
     <p:embeddedFont>
       <p:font typeface="Lato" panose="020B0604020202020204" charset="0"/>
-      <p:regular r:id="rId23"/>
-      <p:bold r:id="rId24"/>
-      <p:italic r:id="rId25"/>
-      <p:boldItalic r:id="rId26"/>
+      <p:regular r:id="rId22"/>
+      <p:bold r:id="rId23"/>
+      <p:italic r:id="rId24"/>
+      <p:boldItalic r:id="rId25"/>
     </p:embeddedFont>
     <p:embeddedFont>
       <p:font typeface="Raleway" panose="020B0604020202020204" charset="0"/>
-      <p:regular r:id="rId27"/>
-      <p:bold r:id="rId28"/>
-      <p:italic r:id="rId29"/>
-      <p:boldItalic r:id="rId30"/>
+      <p:regular r:id="rId26"/>
+      <p:bold r:id="rId27"/>
+      <p:italic r:id="rId28"/>
+      <p:boldItalic r:id="rId29"/>
     </p:embeddedFont>
   </p:embeddedFontLst>
   <p:defaultTextStyle>
@@ -307,11 +306,93 @@
 <pc:chgInfo xmlns:a="http://schemas.openxmlformats.org/drawingml/2006/main" xmlns:r="http://schemas.openxmlformats.org/officeDocument/2006/relationships" xmlns:ac="http://schemas.microsoft.com/office/drawing/2013/main/command" xmlns:pc="http://schemas.microsoft.com/office/powerpoint/2013/main/command">
   <pc:docChgLst>
     <pc:chgData name="Colin" userId="c2c872a862d4dd17" providerId="LiveId" clId="{DBF0D679-A1D2-41BA-9DE5-196B1668C167}"/>
-    <pc:docChg chg="custSel addSld modSld">
-      <pc:chgData name="Colin" userId="c2c872a862d4dd17" providerId="LiveId" clId="{DBF0D679-A1D2-41BA-9DE5-196B1668C167}" dt="2020-07-20T00:40:55.321" v="30" actId="1076"/>
+    <pc:docChg chg="undo custSel addSld delSld modSld">
+      <pc:chgData name="Colin" userId="c2c872a862d4dd17" providerId="LiveId" clId="{DBF0D679-A1D2-41BA-9DE5-196B1668C167}" dt="2020-07-20T00:53:45.725" v="1003" actId="20577"/>
       <pc:docMkLst>
         <pc:docMk/>
       </pc:docMkLst>
+      <pc:sldChg chg="modSp mod">
+        <pc:chgData name="Colin" userId="c2c872a862d4dd17" providerId="LiveId" clId="{DBF0D679-A1D2-41BA-9DE5-196B1668C167}" dt="2020-07-20T00:53:45.725" v="1003" actId="20577"/>
+        <pc:sldMkLst>
+          <pc:docMk/>
+          <pc:sldMk cId="0" sldId="262"/>
+        </pc:sldMkLst>
+        <pc:spChg chg="mod">
+          <ac:chgData name="Colin" userId="c2c872a862d4dd17" providerId="LiveId" clId="{DBF0D679-A1D2-41BA-9DE5-196B1668C167}" dt="2020-07-20T00:53:45.725" v="1003" actId="20577"/>
+          <ac:spMkLst>
+            <pc:docMk/>
+            <pc:sldMk cId="0" sldId="262"/>
+            <ac:spMk id="109" creationId="{00000000-0000-0000-0000-000000000000}"/>
+          </ac:spMkLst>
+        </pc:spChg>
+      </pc:sldChg>
+      <pc:sldChg chg="modSp mod">
+        <pc:chgData name="Colin" userId="c2c872a862d4dd17" providerId="LiveId" clId="{DBF0D679-A1D2-41BA-9DE5-196B1668C167}" dt="2020-07-20T00:49:24.234" v="400" actId="20577"/>
+        <pc:sldMkLst>
+          <pc:docMk/>
+          <pc:sldMk cId="0" sldId="263"/>
+        </pc:sldMkLst>
+        <pc:spChg chg="mod">
+          <ac:chgData name="Colin" userId="c2c872a862d4dd17" providerId="LiveId" clId="{DBF0D679-A1D2-41BA-9DE5-196B1668C167}" dt="2020-07-20T00:49:24.234" v="400" actId="20577"/>
+          <ac:spMkLst>
+            <pc:docMk/>
+            <pc:sldMk cId="0" sldId="263"/>
+            <ac:spMk id="115" creationId="{00000000-0000-0000-0000-000000000000}"/>
+          </ac:spMkLst>
+        </pc:spChg>
+      </pc:sldChg>
+      <pc:sldChg chg="modSp mod">
+        <pc:chgData name="Colin" userId="c2c872a862d4dd17" providerId="LiveId" clId="{DBF0D679-A1D2-41BA-9DE5-196B1668C167}" dt="2020-07-20T00:48:17.574" v="266" actId="20577"/>
+        <pc:sldMkLst>
+          <pc:docMk/>
+          <pc:sldMk cId="0" sldId="266"/>
+        </pc:sldMkLst>
+        <pc:spChg chg="mod">
+          <ac:chgData name="Colin" userId="c2c872a862d4dd17" providerId="LiveId" clId="{DBF0D679-A1D2-41BA-9DE5-196B1668C167}" dt="2020-07-20T00:48:17.574" v="266" actId="20577"/>
+          <ac:spMkLst>
+            <pc:docMk/>
+            <pc:sldMk cId="0" sldId="266"/>
+            <ac:spMk id="133" creationId="{00000000-0000-0000-0000-000000000000}"/>
+          </ac:spMkLst>
+        </pc:spChg>
+      </pc:sldChg>
+      <pc:sldChg chg="addSp delSp modSp mod">
+        <pc:chgData name="Colin" userId="c2c872a862d4dd17" providerId="LiveId" clId="{DBF0D679-A1D2-41BA-9DE5-196B1668C167}" dt="2020-07-20T00:52:25.827" v="970" actId="20577"/>
+        <pc:sldMkLst>
+          <pc:docMk/>
+          <pc:sldMk cId="0" sldId="267"/>
+        </pc:sldMkLst>
+        <pc:spChg chg="add del mod">
+          <ac:chgData name="Colin" userId="c2c872a862d4dd17" providerId="LiveId" clId="{DBF0D679-A1D2-41BA-9DE5-196B1668C167}" dt="2020-07-20T00:52:25.827" v="970" actId="20577"/>
+          <ac:spMkLst>
+            <pc:docMk/>
+            <pc:sldMk cId="0" sldId="267"/>
+            <ac:spMk id="139" creationId="{00000000-0000-0000-0000-000000000000}"/>
+          </ac:spMkLst>
+        </pc:spChg>
+      </pc:sldChg>
+      <pc:sldChg chg="modSp mod">
+        <pc:chgData name="Colin" userId="c2c872a862d4dd17" providerId="LiveId" clId="{DBF0D679-A1D2-41BA-9DE5-196B1668C167}" dt="2020-07-20T00:44:33.604" v="48" actId="20577"/>
+        <pc:sldMkLst>
+          <pc:docMk/>
+          <pc:sldMk cId="0" sldId="269"/>
+        </pc:sldMkLst>
+        <pc:spChg chg="mod">
+          <ac:chgData name="Colin" userId="c2c872a862d4dd17" providerId="LiveId" clId="{DBF0D679-A1D2-41BA-9DE5-196B1668C167}" dt="2020-07-20T00:44:33.604" v="48" actId="20577"/>
+          <ac:spMkLst>
+            <pc:docMk/>
+            <pc:sldMk cId="0" sldId="269"/>
+            <ac:spMk id="150" creationId="{00000000-0000-0000-0000-000000000000}"/>
+          </ac:spMkLst>
+        </pc:spChg>
+      </pc:sldChg>
+      <pc:sldChg chg="del">
+        <pc:chgData name="Colin" userId="c2c872a862d4dd17" providerId="LiveId" clId="{DBF0D679-A1D2-41BA-9DE5-196B1668C167}" dt="2020-07-20T00:44:37.870" v="49" actId="2696"/>
+        <pc:sldMkLst>
+          <pc:docMk/>
+          <pc:sldMk cId="0" sldId="270"/>
+        </pc:sldMkLst>
+      </pc:sldChg>
       <pc:sldChg chg="modSp mod">
         <pc:chgData name="Colin" userId="c2c872a862d4dd17" providerId="LiveId" clId="{DBF0D679-A1D2-41BA-9DE5-196B1668C167}" dt="2020-07-20T00:39:28.565" v="9" actId="20577"/>
         <pc:sldMkLst>
@@ -1041,7 +1122,7 @@
         </p:nvSpPr>
         <p:spPr>
           <a:xfrm>
-            <a:off x="381300" y="685800"/>
+            <a:off x="381000" y="685800"/>
             <a:ext cx="6096000" cy="3429000"/>
           </a:xfrm>
           <a:custGeom>
@@ -1145,7 +1226,7 @@
         </p:nvSpPr>
         <p:spPr>
           <a:xfrm>
-            <a:off x="381300" y="685800"/>
+            <a:off x="381000" y="685800"/>
             <a:ext cx="6096000" cy="3429000"/>
           </a:xfrm>
           <a:custGeom>
@@ -1353,7 +1434,7 @@
         </p:nvSpPr>
         <p:spPr>
           <a:xfrm>
-            <a:off x="381300" y="685800"/>
+            <a:off x="381000" y="685800"/>
             <a:ext cx="6096000" cy="3429000"/>
           </a:xfrm>
           <a:custGeom>
@@ -1429,110 +1510,6 @@
 </file>
 
 <file path=ppt/notesSlides/notesSlide15.xml><?xml version="1.0" encoding="utf-8"?>
-<p:notes xmlns:a="http://schemas.openxmlformats.org/drawingml/2006/main" xmlns:r="http://schemas.openxmlformats.org/officeDocument/2006/relationships" xmlns:p="http://schemas.openxmlformats.org/presentationml/2006/main" showMasterSp="0" showMasterPhAnim="0">
-  <p:cSld>
-    <p:spTree>
-      <p:nvGrpSpPr>
-        <p:cNvPr id="1" name="Shape 152"/>
-        <p:cNvGrpSpPr/>
-        <p:nvPr/>
-      </p:nvGrpSpPr>
-      <p:grpSpPr>
-        <a:xfrm>
-          <a:off x="0" y="0"/>
-          <a:ext cx="0" cy="0"/>
-          <a:chOff x="0" y="0"/>
-          <a:chExt cx="0" cy="0"/>
-        </a:xfrm>
-      </p:grpSpPr>
-      <p:sp>
-        <p:nvSpPr>
-          <p:cNvPr id="153" name="Google Shape;153;g8db37c88b9_0_64:notes"/>
-          <p:cNvSpPr>
-            <a:spLocks noGrp="1" noRot="1" noChangeAspect="1"/>
-          </p:cNvSpPr>
-          <p:nvPr>
-            <p:ph type="sldImg" idx="2"/>
-          </p:nvPr>
-        </p:nvSpPr>
-        <p:spPr>
-          <a:xfrm>
-            <a:off x="381300" y="685800"/>
-            <a:ext cx="6096000" cy="3429000"/>
-          </a:xfrm>
-          <a:custGeom>
-            <a:avLst/>
-            <a:gdLst/>
-            <a:ahLst/>
-            <a:cxnLst/>
-            <a:rect l="l" t="t" r="r" b="b"/>
-            <a:pathLst>
-              <a:path w="120000" h="120000" extrusionOk="0">
-                <a:moveTo>
-                  <a:pt x="0" y="0"/>
-                </a:moveTo>
-                <a:lnTo>
-                  <a:pt x="120000" y="0"/>
-                </a:lnTo>
-                <a:lnTo>
-                  <a:pt x="120000" y="120000"/>
-                </a:lnTo>
-                <a:lnTo>
-                  <a:pt x="0" y="120000"/>
-                </a:lnTo>
-                <a:close/>
-              </a:path>
-            </a:pathLst>
-          </a:custGeom>
-        </p:spPr>
-      </p:sp>
-      <p:sp>
-        <p:nvSpPr>
-          <p:cNvPr id="154" name="Google Shape;154;g8db37c88b9_0_64:notes"/>
-          <p:cNvSpPr txBox="1">
-            <a:spLocks noGrp="1"/>
-          </p:cNvSpPr>
-          <p:nvPr>
-            <p:ph type="body" idx="1"/>
-          </p:nvPr>
-        </p:nvSpPr>
-        <p:spPr>
-          <a:xfrm>
-            <a:off x="685800" y="4343400"/>
-            <a:ext cx="5486400" cy="4114800"/>
-          </a:xfrm>
-          <a:prstGeom prst="rect">
-            <a:avLst/>
-          </a:prstGeom>
-        </p:spPr>
-        <p:txBody>
-          <a:bodyPr spcFirstLastPara="1" wrap="square" lIns="91425" tIns="91425" rIns="91425" bIns="91425" anchor="t" anchorCtr="0">
-            <a:noAutofit/>
-          </a:bodyPr>
-          <a:lstStyle/>
-          <a:p>
-            <a:pPr marL="0" lvl="0" indent="0" algn="l" rtl="0">
-              <a:spcBef>
-                <a:spcPts val="0"/>
-              </a:spcBef>
-              <a:spcAft>
-                <a:spcPts val="0"/>
-              </a:spcAft>
-              <a:buNone/>
-            </a:pPr>
-            <a:endParaRPr/>
-          </a:p>
-        </p:txBody>
-      </p:sp>
-    </p:spTree>
-  </p:cSld>
-  <p:clrMapOvr>
-    <a:masterClrMapping/>
-  </p:clrMapOvr>
-</p:notes>
-</file>
-
-<file path=ppt/notesSlides/notesSlide16.xml><?xml version="1.0" encoding="utf-8"?>
 <p:notes xmlns:a="http://schemas.openxmlformats.org/drawingml/2006/main" xmlns:r="http://schemas.openxmlformats.org/officeDocument/2006/relationships" xmlns:p="http://schemas.openxmlformats.org/presentationml/2006/main" showMasterSp="0" showMasterPhAnim="0">
   <p:cSld>
     <p:spTree>
@@ -1593,6 +1570,110 @@
       <p:sp>
         <p:nvSpPr>
           <p:cNvPr id="160" name="Google Shape;160;g8db37c88b9_0_74:notes"/>
+          <p:cNvSpPr txBox="1">
+            <a:spLocks noGrp="1"/>
+          </p:cNvSpPr>
+          <p:nvPr>
+            <p:ph type="body" idx="1"/>
+          </p:nvPr>
+        </p:nvSpPr>
+        <p:spPr>
+          <a:xfrm>
+            <a:off x="685800" y="4343400"/>
+            <a:ext cx="5486400" cy="4114800"/>
+          </a:xfrm>
+          <a:prstGeom prst="rect">
+            <a:avLst/>
+          </a:prstGeom>
+        </p:spPr>
+        <p:txBody>
+          <a:bodyPr spcFirstLastPara="1" wrap="square" lIns="91425" tIns="91425" rIns="91425" bIns="91425" anchor="t" anchorCtr="0">
+            <a:noAutofit/>
+          </a:bodyPr>
+          <a:lstStyle/>
+          <a:p>
+            <a:pPr marL="0" lvl="0" indent="0" algn="l" rtl="0">
+              <a:spcBef>
+                <a:spcPts val="0"/>
+              </a:spcBef>
+              <a:spcAft>
+                <a:spcPts val="0"/>
+              </a:spcAft>
+              <a:buNone/>
+            </a:pPr>
+            <a:endParaRPr/>
+          </a:p>
+        </p:txBody>
+      </p:sp>
+    </p:spTree>
+  </p:cSld>
+  <p:clrMapOvr>
+    <a:masterClrMapping/>
+  </p:clrMapOvr>
+</p:notes>
+</file>
+
+<file path=ppt/notesSlides/notesSlide16.xml><?xml version="1.0" encoding="utf-8"?>
+<p:notes xmlns:a="http://schemas.openxmlformats.org/drawingml/2006/main" xmlns:r="http://schemas.openxmlformats.org/officeDocument/2006/relationships" xmlns:p="http://schemas.openxmlformats.org/presentationml/2006/main" showMasterSp="0" showMasterPhAnim="0">
+  <p:cSld>
+    <p:spTree>
+      <p:nvGrpSpPr>
+        <p:cNvPr id="1" name="Shape 164"/>
+        <p:cNvGrpSpPr/>
+        <p:nvPr/>
+      </p:nvGrpSpPr>
+      <p:grpSpPr>
+        <a:xfrm>
+          <a:off x="0" y="0"/>
+          <a:ext cx="0" cy="0"/>
+          <a:chOff x="0" y="0"/>
+          <a:chExt cx="0" cy="0"/>
+        </a:xfrm>
+      </p:grpSpPr>
+      <p:sp>
+        <p:nvSpPr>
+          <p:cNvPr id="165" name="Google Shape;165;g8db37c88b9_0_69:notes"/>
+          <p:cNvSpPr>
+            <a:spLocks noGrp="1" noRot="1" noChangeAspect="1"/>
+          </p:cNvSpPr>
+          <p:nvPr>
+            <p:ph type="sldImg" idx="2"/>
+          </p:nvPr>
+        </p:nvSpPr>
+        <p:spPr>
+          <a:xfrm>
+            <a:off x="381000" y="685800"/>
+            <a:ext cx="6096000" cy="3429000"/>
+          </a:xfrm>
+          <a:custGeom>
+            <a:avLst/>
+            <a:gdLst/>
+            <a:ahLst/>
+            <a:cxnLst/>
+            <a:rect l="l" t="t" r="r" b="b"/>
+            <a:pathLst>
+              <a:path w="120000" h="120000" extrusionOk="0">
+                <a:moveTo>
+                  <a:pt x="0" y="0"/>
+                </a:moveTo>
+                <a:lnTo>
+                  <a:pt x="120000" y="0"/>
+                </a:lnTo>
+                <a:lnTo>
+                  <a:pt x="120000" y="120000"/>
+                </a:lnTo>
+                <a:lnTo>
+                  <a:pt x="0" y="120000"/>
+                </a:lnTo>
+                <a:close/>
+              </a:path>
+            </a:pathLst>
+          </a:custGeom>
+        </p:spPr>
+      </p:sp>
+      <p:sp>
+        <p:nvSpPr>
+          <p:cNvPr id="166" name="Google Shape;166;g8db37c88b9_0_69:notes"/>
           <p:cNvSpPr txBox="1">
             <a:spLocks noGrp="1"/>
           </p:cNvSpPr>
@@ -1733,110 +1814,6 @@
         </p:txBody>
       </p:sp>
     </p:spTree>
-  </p:cSld>
-  <p:clrMapOvr>
-    <a:masterClrMapping/>
-  </p:clrMapOvr>
-</p:notes>
-</file>
-
-<file path=ppt/notesSlides/notesSlide18.xml><?xml version="1.0" encoding="utf-8"?>
-<p:notes xmlns:a="http://schemas.openxmlformats.org/drawingml/2006/main" xmlns:r="http://schemas.openxmlformats.org/officeDocument/2006/relationships" xmlns:p="http://schemas.openxmlformats.org/presentationml/2006/main" showMasterSp="0" showMasterPhAnim="0">
-  <p:cSld>
-    <p:spTree>
-      <p:nvGrpSpPr>
-        <p:cNvPr id="1" name="Shape 164"/>
-        <p:cNvGrpSpPr/>
-        <p:nvPr/>
-      </p:nvGrpSpPr>
-      <p:grpSpPr>
-        <a:xfrm>
-          <a:off x="0" y="0"/>
-          <a:ext cx="0" cy="0"/>
-          <a:chOff x="0" y="0"/>
-          <a:chExt cx="0" cy="0"/>
-        </a:xfrm>
-      </p:grpSpPr>
-      <p:sp>
-        <p:nvSpPr>
-          <p:cNvPr id="165" name="Google Shape;165;g8db37c88b9_0_69:notes"/>
-          <p:cNvSpPr>
-            <a:spLocks noGrp="1" noRot="1" noChangeAspect="1"/>
-          </p:cNvSpPr>
-          <p:nvPr>
-            <p:ph type="sldImg" idx="2"/>
-          </p:nvPr>
-        </p:nvSpPr>
-        <p:spPr>
-          <a:xfrm>
-            <a:off x="381000" y="685800"/>
-            <a:ext cx="6096000" cy="3429000"/>
-          </a:xfrm>
-          <a:custGeom>
-            <a:avLst/>
-            <a:gdLst/>
-            <a:ahLst/>
-            <a:cxnLst/>
-            <a:rect l="l" t="t" r="r" b="b"/>
-            <a:pathLst>
-              <a:path w="120000" h="120000" extrusionOk="0">
-                <a:moveTo>
-                  <a:pt x="0" y="0"/>
-                </a:moveTo>
-                <a:lnTo>
-                  <a:pt x="120000" y="0"/>
-                </a:lnTo>
-                <a:lnTo>
-                  <a:pt x="120000" y="120000"/>
-                </a:lnTo>
-                <a:lnTo>
-                  <a:pt x="0" y="120000"/>
-                </a:lnTo>
-                <a:close/>
-              </a:path>
-            </a:pathLst>
-          </a:custGeom>
-        </p:spPr>
-      </p:sp>
-      <p:sp>
-        <p:nvSpPr>
-          <p:cNvPr id="166" name="Google Shape;166;g8db37c88b9_0_69:notes"/>
-          <p:cNvSpPr txBox="1">
-            <a:spLocks noGrp="1"/>
-          </p:cNvSpPr>
-          <p:nvPr>
-            <p:ph type="body" idx="1"/>
-          </p:nvPr>
-        </p:nvSpPr>
-        <p:spPr>
-          <a:xfrm>
-            <a:off x="685800" y="4343400"/>
-            <a:ext cx="5486400" cy="4114800"/>
-          </a:xfrm>
-          <a:prstGeom prst="rect">
-            <a:avLst/>
-          </a:prstGeom>
-        </p:spPr>
-        <p:txBody>
-          <a:bodyPr spcFirstLastPara="1" wrap="square" lIns="91425" tIns="91425" rIns="91425" bIns="91425" anchor="t" anchorCtr="0">
-            <a:noAutofit/>
-          </a:bodyPr>
-          <a:lstStyle/>
-          <a:p>
-            <a:pPr marL="0" lvl="0" indent="0" algn="l" rtl="0">
-              <a:spcBef>
-                <a:spcPts val="0"/>
-              </a:spcBef>
-              <a:spcAft>
-                <a:spcPts val="0"/>
-              </a:spcAft>
-              <a:buNone/>
-            </a:pPr>
-            <a:endParaRPr/>
-          </a:p>
-        </p:txBody>
-      </p:sp>
-    </p:spTree>
     <p:extLst>
       <p:ext uri="{BB962C8B-B14F-4D97-AF65-F5344CB8AC3E}">
         <p14:creationId xmlns:p14="http://schemas.microsoft.com/office/powerpoint/2010/main" val="2055091841"/>
@@ -1849,7 +1826,7 @@
 </p:notes>
 </file>
 
-<file path=ppt/notesSlides/notesSlide19.xml><?xml version="1.0" encoding="utf-8"?>
+<file path=ppt/notesSlides/notesSlide18.xml><?xml version="1.0" encoding="utf-8"?>
 <p:notes xmlns:a="http://schemas.openxmlformats.org/drawingml/2006/main" xmlns:r="http://schemas.openxmlformats.org/officeDocument/2006/relationships" xmlns:p="http://schemas.openxmlformats.org/presentationml/2006/main" showMasterSp="0" showMasterPhAnim="0">
   <p:cSld>
     <p:spTree>
@@ -1910,6 +1887,110 @@
       <p:sp>
         <p:nvSpPr>
           <p:cNvPr id="172" name="Google Shape;172;g8db37c88b9_0_79:notes"/>
+          <p:cNvSpPr txBox="1">
+            <a:spLocks noGrp="1"/>
+          </p:cNvSpPr>
+          <p:nvPr>
+            <p:ph type="body" idx="1"/>
+          </p:nvPr>
+        </p:nvSpPr>
+        <p:spPr>
+          <a:xfrm>
+            <a:off x="685800" y="4343400"/>
+            <a:ext cx="5486400" cy="4114800"/>
+          </a:xfrm>
+          <a:prstGeom prst="rect">
+            <a:avLst/>
+          </a:prstGeom>
+        </p:spPr>
+        <p:txBody>
+          <a:bodyPr spcFirstLastPara="1" wrap="square" lIns="91425" tIns="91425" rIns="91425" bIns="91425" anchor="t" anchorCtr="0">
+            <a:noAutofit/>
+          </a:bodyPr>
+          <a:lstStyle/>
+          <a:p>
+            <a:pPr marL="0" lvl="0" indent="0" algn="l" rtl="0">
+              <a:spcBef>
+                <a:spcPts val="0"/>
+              </a:spcBef>
+              <a:spcAft>
+                <a:spcPts val="0"/>
+              </a:spcAft>
+              <a:buNone/>
+            </a:pPr>
+            <a:endParaRPr/>
+          </a:p>
+        </p:txBody>
+      </p:sp>
+    </p:spTree>
+  </p:cSld>
+  <p:clrMapOvr>
+    <a:masterClrMapping/>
+  </p:clrMapOvr>
+</p:notes>
+</file>
+
+<file path=ppt/notesSlides/notesSlide19.xml><?xml version="1.0" encoding="utf-8"?>
+<p:notes xmlns:a="http://schemas.openxmlformats.org/drawingml/2006/main" xmlns:r="http://schemas.openxmlformats.org/officeDocument/2006/relationships" xmlns:p="http://schemas.openxmlformats.org/presentationml/2006/main" showMasterSp="0" showMasterPhAnim="0">
+  <p:cSld>
+    <p:spTree>
+      <p:nvGrpSpPr>
+        <p:cNvPr id="1" name="Shape 176"/>
+        <p:cNvGrpSpPr/>
+        <p:nvPr/>
+      </p:nvGrpSpPr>
+      <p:grpSpPr>
+        <a:xfrm>
+          <a:off x="0" y="0"/>
+          <a:ext cx="0" cy="0"/>
+          <a:chOff x="0" y="0"/>
+          <a:chExt cx="0" cy="0"/>
+        </a:xfrm>
+      </p:grpSpPr>
+      <p:sp>
+        <p:nvSpPr>
+          <p:cNvPr id="177" name="Google Shape;177;g8db37c88b9_0_84:notes"/>
+          <p:cNvSpPr>
+            <a:spLocks noGrp="1" noRot="1" noChangeAspect="1"/>
+          </p:cNvSpPr>
+          <p:nvPr>
+            <p:ph type="sldImg" idx="2"/>
+          </p:nvPr>
+        </p:nvSpPr>
+        <p:spPr>
+          <a:xfrm>
+            <a:off x="381300" y="685800"/>
+            <a:ext cx="6096000" cy="3429000"/>
+          </a:xfrm>
+          <a:custGeom>
+            <a:avLst/>
+            <a:gdLst/>
+            <a:ahLst/>
+            <a:cxnLst/>
+            <a:rect l="l" t="t" r="r" b="b"/>
+            <a:pathLst>
+              <a:path w="120000" h="120000" extrusionOk="0">
+                <a:moveTo>
+                  <a:pt x="0" y="0"/>
+                </a:moveTo>
+                <a:lnTo>
+                  <a:pt x="120000" y="0"/>
+                </a:lnTo>
+                <a:lnTo>
+                  <a:pt x="120000" y="120000"/>
+                </a:lnTo>
+                <a:lnTo>
+                  <a:pt x="0" y="120000"/>
+                </a:lnTo>
+                <a:close/>
+              </a:path>
+            </a:pathLst>
+          </a:custGeom>
+        </p:spPr>
+      </p:sp>
+      <p:sp>
+        <p:nvSpPr>
+          <p:cNvPr id="178" name="Google Shape;178;g8db37c88b9_0_84:notes"/>
           <p:cNvSpPr txBox="1">
             <a:spLocks noGrp="1"/>
           </p:cNvSpPr>
@@ -2057,110 +2138,6 @@
 </p:notes>
 </file>
 
-<file path=ppt/notesSlides/notesSlide20.xml><?xml version="1.0" encoding="utf-8"?>
-<p:notes xmlns:a="http://schemas.openxmlformats.org/drawingml/2006/main" xmlns:r="http://schemas.openxmlformats.org/officeDocument/2006/relationships" xmlns:p="http://schemas.openxmlformats.org/presentationml/2006/main" showMasterSp="0" showMasterPhAnim="0">
-  <p:cSld>
-    <p:spTree>
-      <p:nvGrpSpPr>
-        <p:cNvPr id="1" name="Shape 176"/>
-        <p:cNvGrpSpPr/>
-        <p:nvPr/>
-      </p:nvGrpSpPr>
-      <p:grpSpPr>
-        <a:xfrm>
-          <a:off x="0" y="0"/>
-          <a:ext cx="0" cy="0"/>
-          <a:chOff x="0" y="0"/>
-          <a:chExt cx="0" cy="0"/>
-        </a:xfrm>
-      </p:grpSpPr>
-      <p:sp>
-        <p:nvSpPr>
-          <p:cNvPr id="177" name="Google Shape;177;g8db37c88b9_0_84:notes"/>
-          <p:cNvSpPr>
-            <a:spLocks noGrp="1" noRot="1" noChangeAspect="1"/>
-          </p:cNvSpPr>
-          <p:nvPr>
-            <p:ph type="sldImg" idx="2"/>
-          </p:nvPr>
-        </p:nvSpPr>
-        <p:spPr>
-          <a:xfrm>
-            <a:off x="381300" y="685800"/>
-            <a:ext cx="6096000" cy="3429000"/>
-          </a:xfrm>
-          <a:custGeom>
-            <a:avLst/>
-            <a:gdLst/>
-            <a:ahLst/>
-            <a:cxnLst/>
-            <a:rect l="l" t="t" r="r" b="b"/>
-            <a:pathLst>
-              <a:path w="120000" h="120000" extrusionOk="0">
-                <a:moveTo>
-                  <a:pt x="0" y="0"/>
-                </a:moveTo>
-                <a:lnTo>
-                  <a:pt x="120000" y="0"/>
-                </a:lnTo>
-                <a:lnTo>
-                  <a:pt x="120000" y="120000"/>
-                </a:lnTo>
-                <a:lnTo>
-                  <a:pt x="0" y="120000"/>
-                </a:lnTo>
-                <a:close/>
-              </a:path>
-            </a:pathLst>
-          </a:custGeom>
-        </p:spPr>
-      </p:sp>
-      <p:sp>
-        <p:nvSpPr>
-          <p:cNvPr id="178" name="Google Shape;178;g8db37c88b9_0_84:notes"/>
-          <p:cNvSpPr txBox="1">
-            <a:spLocks noGrp="1"/>
-          </p:cNvSpPr>
-          <p:nvPr>
-            <p:ph type="body" idx="1"/>
-          </p:nvPr>
-        </p:nvSpPr>
-        <p:spPr>
-          <a:xfrm>
-            <a:off x="685800" y="4343400"/>
-            <a:ext cx="5486400" cy="4114800"/>
-          </a:xfrm>
-          <a:prstGeom prst="rect">
-            <a:avLst/>
-          </a:prstGeom>
-        </p:spPr>
-        <p:txBody>
-          <a:bodyPr spcFirstLastPara="1" wrap="square" lIns="91425" tIns="91425" rIns="91425" bIns="91425" anchor="t" anchorCtr="0">
-            <a:noAutofit/>
-          </a:bodyPr>
-          <a:lstStyle/>
-          <a:p>
-            <a:pPr marL="0" lvl="0" indent="0" algn="l" rtl="0">
-              <a:spcBef>
-                <a:spcPts val="0"/>
-              </a:spcBef>
-              <a:spcAft>
-                <a:spcPts val="0"/>
-              </a:spcAft>
-              <a:buNone/>
-            </a:pPr>
-            <a:endParaRPr/>
-          </a:p>
-        </p:txBody>
-      </p:sp>
-    </p:spTree>
-  </p:cSld>
-  <p:clrMapOvr>
-    <a:masterClrMapping/>
-  </p:clrMapOvr>
-</p:notes>
-</file>
-
 <file path=ppt/notesSlides/notesSlide3.xml><?xml version="1.0" encoding="utf-8"?>
 <p:notes xmlns:a="http://schemas.openxmlformats.org/drawingml/2006/main" xmlns:r="http://schemas.openxmlformats.org/officeDocument/2006/relationships" xmlns:p="http://schemas.openxmlformats.org/presentationml/2006/main" showMasterSp="0" showMasterPhAnim="0">
   <p:cSld>
@@ -2606,7 +2583,7 @@
         </p:nvSpPr>
         <p:spPr>
           <a:xfrm>
-            <a:off x="381300" y="685800"/>
+            <a:off x="381000" y="685800"/>
             <a:ext cx="6096000" cy="3429000"/>
           </a:xfrm>
           <a:custGeom>
@@ -2710,7 +2687,7 @@
         </p:nvSpPr>
         <p:spPr>
           <a:xfrm>
-            <a:off x="381300" y="685800"/>
+            <a:off x="381000" y="685800"/>
             <a:ext cx="6096000" cy="3429000"/>
           </a:xfrm>
           <a:custGeom>
@@ -9270,7 +9247,7 @@
               <a:buNone/>
             </a:pPr>
             <a:br>
-              <a:rPr lang="en" sz="1700">
+              <a:rPr lang="en" sz="1700" dirty="0">
                 <a:solidFill>
                   <a:srgbClr val="FFFFFF"/>
                 </a:solidFill>
@@ -9281,7 +9258,7 @@
               </a:rPr>
             </a:br>
             <a:r>
-              <a:rPr lang="en" sz="1700">
+              <a:rPr lang="en" sz="1700" dirty="0">
                 <a:solidFill>
                   <a:srgbClr val="FFFFFF"/>
                 </a:solidFill>
@@ -9292,7 +9269,7 @@
               </a:rPr>
               <a:t>Blah blah</a:t>
             </a:r>
-            <a:endParaRPr sz="1700">
+            <a:endParaRPr sz="1700" dirty="0">
               <a:solidFill>
                 <a:srgbClr val="FFFFFF"/>
               </a:solidFill>
@@ -9387,7 +9364,7 @@
         </p:nvSpPr>
         <p:spPr>
           <a:xfrm>
-            <a:off x="303300" y="1819625"/>
+            <a:off x="303300" y="1783906"/>
             <a:ext cx="8520600" cy="2899200"/>
           </a:xfrm>
           <a:prstGeom prst="rect">
@@ -9414,7 +9391,7 @@
               <a:buNone/>
             </a:pPr>
             <a:br>
-              <a:rPr lang="en" sz="1700">
+              <a:rPr lang="en" sz="1700" dirty="0">
                 <a:solidFill>
                   <a:srgbClr val="FFFFFF"/>
                 </a:solidFill>
@@ -9425,7 +9402,7 @@
               </a:rPr>
             </a:br>
             <a:r>
-              <a:rPr lang="en" sz="1700">
+              <a:rPr lang="en" sz="1700" dirty="0">
                 <a:solidFill>
                   <a:srgbClr val="FFFFFF"/>
                 </a:solidFill>
@@ -9434,9 +9411,9 @@
                 <a:cs typeface="Lato"/>
                 <a:sym typeface="Lato"/>
               </a:rPr>
-              <a:t>Blah blah</a:t>
+              <a:t>To gather the temperature information from the OpenWeatherAPI we used a library called Axios. Axios is a promise based HTTP client for the browser and node.js.  The process is triggered by an individual changing what city they have selected.</a:t>
             </a:r>
-            <a:endParaRPr sz="1700">
+            <a:endParaRPr sz="1700" dirty="0">
               <a:solidFill>
                 <a:srgbClr val="FFFFFF"/>
               </a:solidFill>
@@ -9508,14 +9485,14 @@
               <a:buNone/>
             </a:pPr>
             <a:r>
-              <a:rPr lang="en" sz="3600">
+              <a:rPr lang="en" sz="3600" dirty="0">
                 <a:solidFill>
                   <a:srgbClr val="FFFFFF"/>
                 </a:solidFill>
               </a:rPr>
               <a:t>Javascript 3</a:t>
             </a:r>
-            <a:endParaRPr sz="3600">
+            <a:endParaRPr sz="3600" dirty="0">
               <a:solidFill>
                 <a:srgbClr val="FFFFFF"/>
               </a:solidFill>
@@ -9652,14 +9629,14 @@
               <a:buNone/>
             </a:pPr>
             <a:r>
-              <a:rPr lang="en" sz="3600">
+              <a:rPr lang="en" sz="3600" dirty="0">
                 <a:solidFill>
                   <a:srgbClr val="FFFFFF"/>
                 </a:solidFill>
               </a:rPr>
-              <a:t>JSON, SQL Lite</a:t>
+              <a:t>JSON, SQL Lite, &amp; Python App</a:t>
             </a:r>
-            <a:endParaRPr sz="3600">
+            <a:endParaRPr sz="3600" dirty="0">
               <a:solidFill>
                 <a:srgbClr val="FFFFFF"/>
               </a:solidFill>
@@ -9745,150 +9722,6 @@
 </file>
 
 <file path=ppt/slides/slide15.xml><?xml version="1.0" encoding="utf-8"?>
-<p:sld xmlns:a="http://schemas.openxmlformats.org/drawingml/2006/main" xmlns:r="http://schemas.openxmlformats.org/officeDocument/2006/relationships" xmlns:p="http://schemas.openxmlformats.org/presentationml/2006/main">
-  <p:cSld>
-    <p:spTree>
-      <p:nvGrpSpPr>
-        <p:cNvPr id="1" name="Shape 155"/>
-        <p:cNvGrpSpPr/>
-        <p:nvPr/>
-      </p:nvGrpSpPr>
-      <p:grpSpPr>
-        <a:xfrm>
-          <a:off x="0" y="0"/>
-          <a:ext cx="0" cy="0"/>
-          <a:chOff x="0" y="0"/>
-          <a:chExt cx="0" cy="0"/>
-        </a:xfrm>
-      </p:grpSpPr>
-      <p:sp>
-        <p:nvSpPr>
-          <p:cNvPr id="156" name="Google Shape;156;p27"/>
-          <p:cNvSpPr txBox="1">
-            <a:spLocks noGrp="1"/>
-          </p:cNvSpPr>
-          <p:nvPr>
-            <p:ph type="title"/>
-          </p:nvPr>
-        </p:nvSpPr>
-        <p:spPr>
-          <a:xfrm>
-            <a:off x="303300" y="193225"/>
-            <a:ext cx="8520600" cy="639600"/>
-          </a:xfrm>
-          <a:prstGeom prst="rect">
-            <a:avLst/>
-          </a:prstGeom>
-        </p:spPr>
-        <p:txBody>
-          <a:bodyPr spcFirstLastPara="1" wrap="square" lIns="91425" tIns="91425" rIns="91425" bIns="91425" anchor="t" anchorCtr="0">
-            <a:noAutofit/>
-          </a:bodyPr>
-          <a:lstStyle/>
-          <a:p>
-            <a:pPr marL="0" lvl="0" indent="0" algn="l" rtl="0">
-              <a:spcBef>
-                <a:spcPts val="0"/>
-              </a:spcBef>
-              <a:spcAft>
-                <a:spcPts val="0"/>
-              </a:spcAft>
-              <a:buNone/>
-            </a:pPr>
-            <a:r>
-              <a:rPr lang="en" sz="3600">
-                <a:solidFill>
-                  <a:srgbClr val="FFFFFF"/>
-                </a:solidFill>
-              </a:rPr>
-              <a:t>Python App</a:t>
-            </a:r>
-            <a:endParaRPr sz="3600">
-              <a:solidFill>
-                <a:srgbClr val="FFFFFF"/>
-              </a:solidFill>
-            </a:endParaRPr>
-          </a:p>
-        </p:txBody>
-      </p:sp>
-      <p:sp>
-        <p:nvSpPr>
-          <p:cNvPr id="157" name="Google Shape;157;p27"/>
-          <p:cNvSpPr txBox="1"/>
-          <p:nvPr/>
-        </p:nvSpPr>
-        <p:spPr>
-          <a:xfrm>
-            <a:off x="303300" y="1819625"/>
-            <a:ext cx="8520600" cy="2899200"/>
-          </a:xfrm>
-          <a:prstGeom prst="rect">
-            <a:avLst/>
-          </a:prstGeom>
-          <a:noFill/>
-          <a:ln>
-            <a:noFill/>
-          </a:ln>
-        </p:spPr>
-        <p:txBody>
-          <a:bodyPr spcFirstLastPara="1" wrap="square" lIns="91425" tIns="91425" rIns="91425" bIns="91425" anchor="t" anchorCtr="0">
-            <a:noAutofit/>
-          </a:bodyPr>
-          <a:lstStyle/>
-          <a:p>
-            <a:pPr marL="0" lvl="0" indent="0" algn="l" rtl="0">
-              <a:spcBef>
-                <a:spcPts val="0"/>
-              </a:spcBef>
-              <a:spcAft>
-                <a:spcPts val="0"/>
-              </a:spcAft>
-              <a:buNone/>
-            </a:pPr>
-            <a:br>
-              <a:rPr lang="en" sz="1700">
-                <a:solidFill>
-                  <a:srgbClr val="FFFFFF"/>
-                </a:solidFill>
-                <a:latin typeface="Lato"/>
-                <a:ea typeface="Lato"/>
-                <a:cs typeface="Lato"/>
-                <a:sym typeface="Lato"/>
-              </a:rPr>
-            </a:br>
-            <a:r>
-              <a:rPr lang="en" sz="1700">
-                <a:solidFill>
-                  <a:srgbClr val="FFFFFF"/>
-                </a:solidFill>
-                <a:latin typeface="Lato"/>
-                <a:ea typeface="Lato"/>
-                <a:cs typeface="Lato"/>
-                <a:sym typeface="Lato"/>
-              </a:rPr>
-              <a:t>Blah blah</a:t>
-            </a:r>
-            <a:endParaRPr sz="1700">
-              <a:solidFill>
-                <a:srgbClr val="FFFFFF"/>
-              </a:solidFill>
-              <a:latin typeface="Lato"/>
-              <a:ea typeface="Lato"/>
-              <a:cs typeface="Lato"/>
-              <a:sym typeface="Lato"/>
-            </a:endParaRPr>
-          </a:p>
-        </p:txBody>
-      </p:sp>
-    </p:spTree>
-  </p:cSld>
-  <p:clrMapOvr>
-    <a:masterClrMapping/>
-  </p:clrMapOvr>
-</p:sld>
-</file>
-
-<file path=ppt/slides/slide16.xml><?xml version="1.0" encoding="utf-8"?>
 <p:sld xmlns:a="http://schemas.openxmlformats.org/drawingml/2006/main" xmlns:r="http://schemas.openxmlformats.org/officeDocument/2006/relationships" xmlns:p="http://schemas.openxmlformats.org/presentationml/2006/main">
   <p:cSld>
     <p:spTree>
@@ -10032,7 +9865,7 @@
 </p:sld>
 </file>
 
-<file path=ppt/slides/slide17.xml><?xml version="1.0" encoding="utf-8"?>
+<file path=ppt/slides/slide16.xml><?xml version="1.0" encoding="utf-8"?>
 <p:sld xmlns:a="http://schemas.openxmlformats.org/drawingml/2006/main" xmlns:r="http://schemas.openxmlformats.org/officeDocument/2006/relationships" xmlns:p="http://schemas.openxmlformats.org/presentationml/2006/main">
   <p:cSld>
     <p:spTree>
@@ -10135,7 +9968,7 @@
 </p:sld>
 </file>
 
-<file path=ppt/slides/slide18.xml><?xml version="1.0" encoding="utf-8"?>
+<file path=ppt/slides/slide17.xml><?xml version="1.0" encoding="utf-8"?>
 <p:sld xmlns:a="http://schemas.openxmlformats.org/drawingml/2006/main" xmlns:r="http://schemas.openxmlformats.org/officeDocument/2006/relationships" xmlns:p="http://schemas.openxmlformats.org/presentationml/2006/main">
   <p:cSld>
     <p:spTree>
@@ -10245,7 +10078,7 @@
 </p:sld>
 </file>
 
-<file path=ppt/slides/slide19.xml><?xml version="1.0" encoding="utf-8"?>
+<file path=ppt/slides/slide18.xml><?xml version="1.0" encoding="utf-8"?>
 <p:sld xmlns:a="http://schemas.openxmlformats.org/drawingml/2006/main" xmlns:r="http://schemas.openxmlformats.org/officeDocument/2006/relationships" xmlns:p="http://schemas.openxmlformats.org/presentationml/2006/main">
   <p:cSld>
     <p:spTree>
@@ -10297,12 +10130,156 @@
               <a:buNone/>
             </a:pPr>
             <a:r>
-              <a:rPr lang="en" sz="3600">
+              <a:rPr lang="en" sz="3600" dirty="0">
                 <a:solidFill>
                   <a:srgbClr val="FFFFFF"/>
                 </a:solidFill>
               </a:rPr>
               <a:t>Summary of Work</a:t>
+            </a:r>
+            <a:endParaRPr sz="3600" dirty="0">
+              <a:solidFill>
+                <a:srgbClr val="FFFFFF"/>
+              </a:solidFill>
+            </a:endParaRPr>
+          </a:p>
+        </p:txBody>
+      </p:sp>
+      <p:sp>
+        <p:nvSpPr>
+          <p:cNvPr id="175" name="Google Shape;175;p30"/>
+          <p:cNvSpPr txBox="1"/>
+          <p:nvPr/>
+        </p:nvSpPr>
+        <p:spPr>
+          <a:xfrm>
+            <a:off x="303300" y="1819625"/>
+            <a:ext cx="8520600" cy="2899200"/>
+          </a:xfrm>
+          <a:prstGeom prst="rect">
+            <a:avLst/>
+          </a:prstGeom>
+          <a:noFill/>
+          <a:ln>
+            <a:noFill/>
+          </a:ln>
+        </p:spPr>
+        <p:txBody>
+          <a:bodyPr spcFirstLastPara="1" wrap="square" lIns="91425" tIns="91425" rIns="91425" bIns="91425" anchor="t" anchorCtr="0">
+            <a:noAutofit/>
+          </a:bodyPr>
+          <a:lstStyle/>
+          <a:p>
+            <a:pPr marL="0" lvl="0" indent="0" algn="l" rtl="0">
+              <a:spcBef>
+                <a:spcPts val="0"/>
+              </a:spcBef>
+              <a:spcAft>
+                <a:spcPts val="0"/>
+              </a:spcAft>
+              <a:buNone/>
+            </a:pPr>
+            <a:br>
+              <a:rPr lang="en" sz="1700">
+                <a:solidFill>
+                  <a:srgbClr val="FFFFFF"/>
+                </a:solidFill>
+                <a:latin typeface="Lato"/>
+                <a:ea typeface="Lato"/>
+                <a:cs typeface="Lato"/>
+                <a:sym typeface="Lato"/>
+              </a:rPr>
+            </a:br>
+            <a:r>
+              <a:rPr lang="en" sz="1700">
+                <a:solidFill>
+                  <a:srgbClr val="FFFFFF"/>
+                </a:solidFill>
+                <a:latin typeface="Lato"/>
+                <a:ea typeface="Lato"/>
+                <a:cs typeface="Lato"/>
+                <a:sym typeface="Lato"/>
+              </a:rPr>
+              <a:t>Blah blah</a:t>
+            </a:r>
+            <a:endParaRPr sz="1700">
+              <a:solidFill>
+                <a:srgbClr val="FFFFFF"/>
+              </a:solidFill>
+              <a:latin typeface="Lato"/>
+              <a:ea typeface="Lato"/>
+              <a:cs typeface="Lato"/>
+              <a:sym typeface="Lato"/>
+            </a:endParaRPr>
+          </a:p>
+        </p:txBody>
+      </p:sp>
+    </p:spTree>
+  </p:cSld>
+  <p:clrMapOvr>
+    <a:masterClrMapping/>
+  </p:clrMapOvr>
+</p:sld>
+</file>
+
+<file path=ppt/slides/slide19.xml><?xml version="1.0" encoding="utf-8"?>
+<p:sld xmlns:a="http://schemas.openxmlformats.org/drawingml/2006/main" xmlns:r="http://schemas.openxmlformats.org/officeDocument/2006/relationships" xmlns:p="http://schemas.openxmlformats.org/presentationml/2006/main">
+  <p:cSld>
+    <p:spTree>
+      <p:nvGrpSpPr>
+        <p:cNvPr id="1" name="Shape 179"/>
+        <p:cNvGrpSpPr/>
+        <p:nvPr/>
+      </p:nvGrpSpPr>
+      <p:grpSpPr>
+        <a:xfrm>
+          <a:off x="0" y="0"/>
+          <a:ext cx="0" cy="0"/>
+          <a:chOff x="0" y="0"/>
+          <a:chExt cx="0" cy="0"/>
+        </a:xfrm>
+      </p:grpSpPr>
+      <p:sp>
+        <p:nvSpPr>
+          <p:cNvPr id="180" name="Google Shape;180;p31"/>
+          <p:cNvSpPr txBox="1">
+            <a:spLocks noGrp="1"/>
+          </p:cNvSpPr>
+          <p:nvPr>
+            <p:ph type="title"/>
+          </p:nvPr>
+        </p:nvSpPr>
+        <p:spPr>
+          <a:xfrm>
+            <a:off x="303300" y="193225"/>
+            <a:ext cx="8520600" cy="639600"/>
+          </a:xfrm>
+          <a:prstGeom prst="rect">
+            <a:avLst/>
+          </a:prstGeom>
+        </p:spPr>
+        <p:txBody>
+          <a:bodyPr spcFirstLastPara="1" wrap="square" lIns="91425" tIns="91425" rIns="91425" bIns="91425" anchor="t" anchorCtr="0">
+            <a:noAutofit/>
+          </a:bodyPr>
+          <a:lstStyle/>
+          <a:p>
+            <a:pPr marL="0" lvl="0" indent="0" algn="l" rtl="0">
+              <a:spcBef>
+                <a:spcPts val="0"/>
+              </a:spcBef>
+              <a:spcAft>
+                <a:spcPts val="0"/>
+              </a:spcAft>
+              <a:buNone/>
+            </a:pPr>
+            <a:r>
+              <a:rPr lang="en" sz="3600">
+                <a:solidFill>
+                  <a:srgbClr val="FFFFFF"/>
+                </a:solidFill>
+              </a:rPr>
+              <a:t>Post-Mortem</a:t>
             </a:r>
             <a:endParaRPr sz="3600">
               <a:solidFill>
@@ -10314,7 +10291,7 @@
       </p:sp>
       <p:sp>
         <p:nvSpPr>
-          <p:cNvPr id="175" name="Google Shape;175;p30"/>
+          <p:cNvPr id="181" name="Google Shape;181;p31"/>
           <p:cNvSpPr txBox="1"/>
           <p:nvPr/>
         </p:nvSpPr>
@@ -10610,150 +10587,6 @@
 </p:sld>
 </file>
 
-<file path=ppt/slides/slide20.xml><?xml version="1.0" encoding="utf-8"?>
-<p:sld xmlns:a="http://schemas.openxmlformats.org/drawingml/2006/main" xmlns:r="http://schemas.openxmlformats.org/officeDocument/2006/relationships" xmlns:p="http://schemas.openxmlformats.org/presentationml/2006/main">
-  <p:cSld>
-    <p:spTree>
-      <p:nvGrpSpPr>
-        <p:cNvPr id="1" name="Shape 179"/>
-        <p:cNvGrpSpPr/>
-        <p:nvPr/>
-      </p:nvGrpSpPr>
-      <p:grpSpPr>
-        <a:xfrm>
-          <a:off x="0" y="0"/>
-          <a:ext cx="0" cy="0"/>
-          <a:chOff x="0" y="0"/>
-          <a:chExt cx="0" cy="0"/>
-        </a:xfrm>
-      </p:grpSpPr>
-      <p:sp>
-        <p:nvSpPr>
-          <p:cNvPr id="180" name="Google Shape;180;p31"/>
-          <p:cNvSpPr txBox="1">
-            <a:spLocks noGrp="1"/>
-          </p:cNvSpPr>
-          <p:nvPr>
-            <p:ph type="title"/>
-          </p:nvPr>
-        </p:nvSpPr>
-        <p:spPr>
-          <a:xfrm>
-            <a:off x="303300" y="193225"/>
-            <a:ext cx="8520600" cy="639600"/>
-          </a:xfrm>
-          <a:prstGeom prst="rect">
-            <a:avLst/>
-          </a:prstGeom>
-        </p:spPr>
-        <p:txBody>
-          <a:bodyPr spcFirstLastPara="1" wrap="square" lIns="91425" tIns="91425" rIns="91425" bIns="91425" anchor="t" anchorCtr="0">
-            <a:noAutofit/>
-          </a:bodyPr>
-          <a:lstStyle/>
-          <a:p>
-            <a:pPr marL="0" lvl="0" indent="0" algn="l" rtl="0">
-              <a:spcBef>
-                <a:spcPts val="0"/>
-              </a:spcBef>
-              <a:spcAft>
-                <a:spcPts val="0"/>
-              </a:spcAft>
-              <a:buNone/>
-            </a:pPr>
-            <a:r>
-              <a:rPr lang="en" sz="3600">
-                <a:solidFill>
-                  <a:srgbClr val="FFFFFF"/>
-                </a:solidFill>
-              </a:rPr>
-              <a:t>Post-Mortem</a:t>
-            </a:r>
-            <a:endParaRPr sz="3600">
-              <a:solidFill>
-                <a:srgbClr val="FFFFFF"/>
-              </a:solidFill>
-            </a:endParaRPr>
-          </a:p>
-        </p:txBody>
-      </p:sp>
-      <p:sp>
-        <p:nvSpPr>
-          <p:cNvPr id="181" name="Google Shape;181;p31"/>
-          <p:cNvSpPr txBox="1"/>
-          <p:nvPr/>
-        </p:nvSpPr>
-        <p:spPr>
-          <a:xfrm>
-            <a:off x="303300" y="1819625"/>
-            <a:ext cx="8520600" cy="2899200"/>
-          </a:xfrm>
-          <a:prstGeom prst="rect">
-            <a:avLst/>
-          </a:prstGeom>
-          <a:noFill/>
-          <a:ln>
-            <a:noFill/>
-          </a:ln>
-        </p:spPr>
-        <p:txBody>
-          <a:bodyPr spcFirstLastPara="1" wrap="square" lIns="91425" tIns="91425" rIns="91425" bIns="91425" anchor="t" anchorCtr="0">
-            <a:noAutofit/>
-          </a:bodyPr>
-          <a:lstStyle/>
-          <a:p>
-            <a:pPr marL="0" lvl="0" indent="0" algn="l" rtl="0">
-              <a:spcBef>
-                <a:spcPts val="0"/>
-              </a:spcBef>
-              <a:spcAft>
-                <a:spcPts val="0"/>
-              </a:spcAft>
-              <a:buNone/>
-            </a:pPr>
-            <a:br>
-              <a:rPr lang="en" sz="1700">
-                <a:solidFill>
-                  <a:srgbClr val="FFFFFF"/>
-                </a:solidFill>
-                <a:latin typeface="Lato"/>
-                <a:ea typeface="Lato"/>
-                <a:cs typeface="Lato"/>
-                <a:sym typeface="Lato"/>
-              </a:rPr>
-            </a:br>
-            <a:r>
-              <a:rPr lang="en" sz="1700">
-                <a:solidFill>
-                  <a:srgbClr val="FFFFFF"/>
-                </a:solidFill>
-                <a:latin typeface="Lato"/>
-                <a:ea typeface="Lato"/>
-                <a:cs typeface="Lato"/>
-                <a:sym typeface="Lato"/>
-              </a:rPr>
-              <a:t>Blah blah</a:t>
-            </a:r>
-            <a:endParaRPr sz="1700">
-              <a:solidFill>
-                <a:srgbClr val="FFFFFF"/>
-              </a:solidFill>
-              <a:latin typeface="Lato"/>
-              <a:ea typeface="Lato"/>
-              <a:cs typeface="Lato"/>
-              <a:sym typeface="Lato"/>
-            </a:endParaRPr>
-          </a:p>
-        </p:txBody>
-      </p:sp>
-    </p:spTree>
-  </p:cSld>
-  <p:clrMapOvr>
-    <a:masterClrMapping/>
-  </p:clrMapOvr>
-</p:sld>
-</file>
-
 <file path=ppt/slides/slide3.xml><?xml version="1.0" encoding="utf-8"?>
 <p:sld xmlns:a="http://schemas.openxmlformats.org/drawingml/2006/main" xmlns:r="http://schemas.openxmlformats.org/officeDocument/2006/relationships" xmlns:p="http://schemas.openxmlformats.org/presentationml/2006/main">
   <p:cSld>
@@ -11753,7 +11586,7 @@
               <a:buNone/>
             </a:pPr>
             <a:r>
-              <a:rPr lang="en" sz="1700">
+              <a:rPr lang="en" sz="1700" dirty="0">
                 <a:solidFill>
                   <a:srgbClr val="FFFFFF"/>
                 </a:solidFill>
@@ -11765,7 +11598,7 @@
               <a:t>List of Parameters- Short description of parameters</a:t>
             </a:r>
             <a:br>
-              <a:rPr lang="en" sz="1700">
+              <a:rPr lang="en" sz="1700" dirty="0">
                 <a:solidFill>
                   <a:srgbClr val="FFFFFF"/>
                 </a:solidFill>
@@ -11776,7 +11609,7 @@
               </a:rPr>
             </a:br>
             <a:r>
-              <a:rPr lang="en" sz="1700">
+              <a:rPr lang="en" sz="1700" dirty="0">
                 <a:solidFill>
                   <a:srgbClr val="FFFFFF"/>
                 </a:solidFill>
@@ -11788,7 +11621,7 @@
               <a:t>Crime</a:t>
             </a:r>
             <a:br>
-              <a:rPr lang="en" sz="1700">
+              <a:rPr lang="en" sz="1700" dirty="0">
                 <a:solidFill>
                   <a:srgbClr val="FFFFFF"/>
                 </a:solidFill>
@@ -11799,7 +11632,7 @@
               </a:rPr>
             </a:br>
             <a:r>
-              <a:rPr lang="en" sz="1700">
+              <a:rPr lang="en" sz="1700" dirty="0">
                 <a:solidFill>
                   <a:srgbClr val="FFFFFF"/>
                 </a:solidFill>
@@ -11811,7 +11644,7 @@
               <a:t>Safety</a:t>
             </a:r>
             <a:br>
-              <a:rPr lang="en" sz="1700">
+              <a:rPr lang="en" sz="1700" dirty="0">
                 <a:solidFill>
                   <a:srgbClr val="FFFFFF"/>
                 </a:solidFill>
@@ -11822,7 +11655,7 @@
               </a:rPr>
             </a:br>
             <a:r>
-              <a:rPr lang="en" sz="1700">
+              <a:rPr lang="en" sz="1700" dirty="0">
                 <a:solidFill>
                   <a:srgbClr val="FFFFFF"/>
                 </a:solidFill>
@@ -11834,7 +11667,7 @@
               <a:t>Quality of Life</a:t>
             </a:r>
             <a:br>
-              <a:rPr lang="en" sz="1700">
+              <a:rPr lang="en" sz="1700" dirty="0">
                 <a:solidFill>
                   <a:srgbClr val="FFFFFF"/>
                 </a:solidFill>
@@ -11845,7 +11678,7 @@
               </a:rPr>
             </a:br>
             <a:r>
-              <a:rPr lang="en" sz="1700">
+              <a:rPr lang="en" sz="1700" dirty="0">
                 <a:solidFill>
                   <a:srgbClr val="FFFFFF"/>
                 </a:solidFill>
@@ -11857,7 +11690,7 @@
               <a:t>Purchasing Power</a:t>
             </a:r>
             <a:br>
-              <a:rPr lang="en" sz="1700">
+              <a:rPr lang="en" sz="1700" dirty="0">
                 <a:solidFill>
                   <a:srgbClr val="FFFFFF"/>
                 </a:solidFill>
@@ -11868,7 +11701,7 @@
               </a:rPr>
             </a:br>
             <a:r>
-              <a:rPr lang="en" sz="1700">
+              <a:rPr lang="en" sz="1700" dirty="0">
                 <a:solidFill>
                   <a:srgbClr val="FFFFFF"/>
                 </a:solidFill>
@@ -11880,7 +11713,7 @@
               <a:t>Healthcare</a:t>
             </a:r>
             <a:br>
-              <a:rPr lang="en" sz="1700">
+              <a:rPr lang="en" sz="1700" dirty="0">
                 <a:solidFill>
                   <a:srgbClr val="FFFFFF"/>
                 </a:solidFill>
@@ -11891,7 +11724,7 @@
               </a:rPr>
             </a:br>
             <a:r>
-              <a:rPr lang="en" sz="1700">
+              <a:rPr lang="en" sz="1700" dirty="0">
                 <a:solidFill>
                   <a:srgbClr val="FFFFFF"/>
                 </a:solidFill>
@@ -11903,7 +11736,7 @@
               <a:t>Cost of Living</a:t>
             </a:r>
             <a:br>
-              <a:rPr lang="en" sz="1700">
+              <a:rPr lang="en" sz="1700" dirty="0">
                 <a:solidFill>
                   <a:srgbClr val="FFFFFF"/>
                 </a:solidFill>
@@ -11914,7 +11747,7 @@
               </a:rPr>
             </a:br>
             <a:r>
-              <a:rPr lang="en" sz="1700">
+              <a:rPr lang="en" sz="1700" dirty="0">
                 <a:solidFill>
                   <a:srgbClr val="FFFFFF"/>
                 </a:solidFill>
@@ -11926,7 +11759,7 @@
               <a:t>Traffic Commute Time</a:t>
             </a:r>
             <a:br>
-              <a:rPr lang="en" sz="1700">
+              <a:rPr lang="en" sz="1700" dirty="0">
                 <a:solidFill>
                   <a:srgbClr val="FFFFFF"/>
                 </a:solidFill>
@@ -11937,7 +11770,7 @@
               </a:rPr>
             </a:br>
             <a:r>
-              <a:rPr lang="en" sz="1700">
+              <a:rPr lang="en" sz="1700" dirty="0">
                 <a:solidFill>
                   <a:srgbClr val="FFFFFF"/>
                 </a:solidFill>
@@ -11949,7 +11782,7 @@
               <a:t>Pollution</a:t>
             </a:r>
             <a:br>
-              <a:rPr lang="en" sz="1700">
+              <a:rPr lang="en" sz="1700" dirty="0">
                 <a:solidFill>
                   <a:srgbClr val="FFFFFF"/>
                 </a:solidFill>
@@ -11960,7 +11793,7 @@
               </a:rPr>
             </a:br>
             <a:r>
-              <a:rPr lang="en" sz="1700">
+              <a:rPr lang="en" sz="1700" dirty="0">
                 <a:solidFill>
                   <a:srgbClr val="FFFFFF"/>
                 </a:solidFill>
@@ -11972,7 +11805,7 @@
               <a:t>Price to Income Ratio</a:t>
             </a:r>
             <a:br>
-              <a:rPr lang="en" sz="1700">
+              <a:rPr lang="en" sz="1700" dirty="0">
                 <a:solidFill>
                   <a:srgbClr val="FFFFFF"/>
                 </a:solidFill>
@@ -11983,7 +11816,7 @@
               </a:rPr>
             </a:br>
             <a:r>
-              <a:rPr lang="en" sz="1700">
+              <a:rPr lang="en" sz="1700" dirty="0">
                 <a:solidFill>
                   <a:srgbClr val="FFFFFF"/>
                 </a:solidFill>
@@ -11994,7 +11827,30 @@
               </a:rPr>
               <a:t>Affordability</a:t>
             </a:r>
-            <a:endParaRPr sz="1700">
+          </a:p>
+          <a:p>
+            <a:pPr marL="0" lvl="0" indent="0" algn="l" rtl="0">
+              <a:spcBef>
+                <a:spcPts val="0"/>
+              </a:spcBef>
+              <a:spcAft>
+                <a:spcPts val="0"/>
+              </a:spcAft>
+              <a:buNone/>
+            </a:pPr>
+            <a:r>
+              <a:rPr lang="en" sz="1700" dirty="0">
+                <a:solidFill>
+                  <a:srgbClr val="FFFFFF"/>
+                </a:solidFill>
+                <a:latin typeface="Lato"/>
+                <a:ea typeface="Lato"/>
+                <a:cs typeface="Lato"/>
+                <a:sym typeface="Lato"/>
+              </a:rPr>
+              <a:t>Temperature</a:t>
+            </a:r>
+            <a:endParaRPr sz="1700" dirty="0">
               <a:solidFill>
                 <a:srgbClr val="FFFFFF"/>
               </a:solidFill>
@@ -12116,7 +11972,7 @@
               <a:buNone/>
             </a:pPr>
             <a:r>
-              <a:rPr lang="en" sz="1700">
+              <a:rPr lang="en" sz="1700" dirty="0">
                 <a:solidFill>
                   <a:srgbClr val="FFFFFF"/>
                 </a:solidFill>
@@ -12128,7 +11984,7 @@
               <a:t>US Census Bureau</a:t>
             </a:r>
             <a:br>
-              <a:rPr lang="en" sz="1700">
+              <a:rPr lang="en" sz="1700" dirty="0">
                 <a:solidFill>
                   <a:srgbClr val="FFFFFF"/>
                 </a:solidFill>
@@ -12139,7 +11995,7 @@
               </a:rPr>
             </a:br>
             <a:r>
-              <a:rPr lang="en" sz="1700">
+              <a:rPr lang="en" sz="1700" dirty="0">
                 <a:solidFill>
                   <a:srgbClr val="FFFFFF"/>
                 </a:solidFill>
@@ -12151,7 +12007,7 @@
               <a:t>FBI</a:t>
             </a:r>
             <a:br>
-              <a:rPr lang="en" sz="1700">
+              <a:rPr lang="en" sz="1700" dirty="0">
                 <a:solidFill>
                   <a:srgbClr val="FFFFFF"/>
                 </a:solidFill>
@@ -12162,7 +12018,7 @@
               </a:rPr>
             </a:br>
             <a:r>
-              <a:rPr lang="en" sz="1700">
+              <a:rPr lang="en" sz="1700" dirty="0">
                 <a:solidFill>
                   <a:srgbClr val="FFFFFF"/>
                 </a:solidFill>
@@ -12173,7 +12029,30 @@
               </a:rPr>
               <a:t>Numbeo</a:t>
             </a:r>
-            <a:endParaRPr sz="1700">
+          </a:p>
+          <a:p>
+            <a:pPr marL="0" lvl="0" indent="0" algn="l" rtl="0">
+              <a:spcBef>
+                <a:spcPts val="0"/>
+              </a:spcBef>
+              <a:spcAft>
+                <a:spcPts val="0"/>
+              </a:spcAft>
+              <a:buNone/>
+            </a:pPr>
+            <a:r>
+              <a:rPr lang="en" sz="1700" dirty="0">
+                <a:solidFill>
+                  <a:srgbClr val="FFFFFF"/>
+                </a:solidFill>
+                <a:latin typeface="Lato"/>
+                <a:ea typeface="Lato"/>
+                <a:cs typeface="Lato"/>
+                <a:sym typeface="Lato"/>
+              </a:rPr>
+              <a:t>OpenWeatherAPI</a:t>
+            </a:r>
+            <a:endParaRPr sz="1700" dirty="0">
               <a:solidFill>
                 <a:srgbClr val="FFFFFF"/>
               </a:solidFill>

</xml_diff>

<commit_message>
removed literally a single dash
</commit_message>
<xml_diff>
--- a/Homies City Collection.pptx
+++ b/Homies City Collection.pptx
@@ -307,18 +307,18 @@
   <pc:docChgLst>
     <pc:chgData name="Colin" userId="c2c872a862d4dd17" providerId="LiveId" clId="{DBF0D679-A1D2-41BA-9DE5-196B1668C167}"/>
     <pc:docChg chg="undo custSel addSld delSld modSld">
-      <pc:chgData name="Colin" userId="c2c872a862d4dd17" providerId="LiveId" clId="{DBF0D679-A1D2-41BA-9DE5-196B1668C167}" dt="2020-07-20T01:06:13.847" v="1033" actId="20577"/>
+      <pc:chgData name="Colin" userId="c2c872a862d4dd17" providerId="LiveId" clId="{DBF0D679-A1D2-41BA-9DE5-196B1668C167}" dt="2020-07-20T01:10:37.143" v="1035" actId="20577"/>
       <pc:docMkLst>
         <pc:docMk/>
       </pc:docMkLst>
       <pc:sldChg chg="modSp mod">
-        <pc:chgData name="Colin" userId="c2c872a862d4dd17" providerId="LiveId" clId="{DBF0D679-A1D2-41BA-9DE5-196B1668C167}" dt="2020-07-20T01:06:13.847" v="1033" actId="20577"/>
+        <pc:chgData name="Colin" userId="c2c872a862d4dd17" providerId="LiveId" clId="{DBF0D679-A1D2-41BA-9DE5-196B1668C167}" dt="2020-07-20T01:10:37.143" v="1035" actId="20577"/>
         <pc:sldMkLst>
           <pc:docMk/>
           <pc:sldMk cId="0" sldId="262"/>
         </pc:sldMkLst>
         <pc:spChg chg="mod">
-          <ac:chgData name="Colin" userId="c2c872a862d4dd17" providerId="LiveId" clId="{DBF0D679-A1D2-41BA-9DE5-196B1668C167}" dt="2020-07-20T01:06:13.847" v="1033" actId="20577"/>
+          <ac:chgData name="Colin" userId="c2c872a862d4dd17" providerId="LiveId" clId="{DBF0D679-A1D2-41BA-9DE5-196B1668C167}" dt="2020-07-20T01:10:37.143" v="1035" actId="20577"/>
           <ac:spMkLst>
             <pc:docMk/>
             <pc:sldMk cId="0" sldId="262"/>
@@ -11577,7 +11577,7 @@
           <a:lstStyle/>
           <a:p>
             <a:pPr algn="ctr"/>
-            <a:endParaRPr lang="en-US" sz="2000">
+            <a:endParaRPr lang="en-US" sz="2000" dirty="0">
               <a:solidFill>
                 <a:srgbClr val="FFFFFF"/>
               </a:solidFill>
@@ -11590,7 +11590,7 @@
           <a:p>
             <a:pPr algn="ctr"/>
             <a:r>
-              <a:rPr lang="en-US" sz="2000">
+              <a:rPr lang="en-US" sz="2000" dirty="0">
                 <a:solidFill>
                   <a:srgbClr val="FFFFFF"/>
                 </a:solidFill>
@@ -11720,7 +11720,7 @@
           <a:p>
             <a:pPr algn="ctr"/>
             <a:r>
-              <a:rPr lang="en-US" sz="2000" dirty="0">
+              <a:rPr lang="en-US" sz="2000">
                 <a:solidFill>
                   <a:srgbClr val="FFFFFF"/>
                 </a:solidFill>
@@ -11729,7 +11729,7 @@
                 <a:cs typeface="Lato"/>
                 <a:sym typeface="Lato"/>
               </a:rPr>
-              <a:t>Pollution –</a:t>
+              <a:t>Pollution</a:t>
             </a:r>
             <a:br>
               <a:rPr lang="en-US" sz="2000" dirty="0">

</xml_diff>

<commit_message>
Added Data Munging slide
</commit_message>
<xml_diff>
--- a/Homies City Collection.pptx
+++ b/Homies City Collection.pptx
@@ -5,7 +5,7 @@
     <p:sldMasterId id="2147483659" r:id="rId1"/>
   </p:sldMasterIdLst>
   <p:notesMasterIdLst>
-    <p:notesMasterId r:id="rId21"/>
+    <p:notesMasterId r:id="rId22"/>
   </p:notesMasterIdLst>
   <p:sldIdLst>
     <p:sldId id="256" r:id="rId2"/>
@@ -16,34 +16,35 @@
     <p:sldId id="261" r:id="rId7"/>
     <p:sldId id="262" r:id="rId8"/>
     <p:sldId id="263" r:id="rId9"/>
-    <p:sldId id="264" r:id="rId10"/>
-    <p:sldId id="265" r:id="rId11"/>
-    <p:sldId id="266" r:id="rId12"/>
-    <p:sldId id="267" r:id="rId13"/>
-    <p:sldId id="268" r:id="rId14"/>
-    <p:sldId id="269" r:id="rId15"/>
-    <p:sldId id="271" r:id="rId16"/>
-    <p:sldId id="272" r:id="rId17"/>
-    <p:sldId id="275" r:id="rId18"/>
-    <p:sldId id="273" r:id="rId19"/>
-    <p:sldId id="274" r:id="rId20"/>
+    <p:sldId id="276" r:id="rId10"/>
+    <p:sldId id="264" r:id="rId11"/>
+    <p:sldId id="265" r:id="rId12"/>
+    <p:sldId id="266" r:id="rId13"/>
+    <p:sldId id="267" r:id="rId14"/>
+    <p:sldId id="268" r:id="rId15"/>
+    <p:sldId id="269" r:id="rId16"/>
+    <p:sldId id="271" r:id="rId17"/>
+    <p:sldId id="272" r:id="rId18"/>
+    <p:sldId id="275" r:id="rId19"/>
+    <p:sldId id="273" r:id="rId20"/>
+    <p:sldId id="274" r:id="rId21"/>
   </p:sldIdLst>
   <p:sldSz cx="9144000" cy="5143500" type="screen16x9"/>
   <p:notesSz cx="6858000" cy="9144000"/>
   <p:embeddedFontLst>
     <p:embeddedFont>
-      <p:font typeface="Lato" panose="020F0502020204030203" pitchFamily="34" charset="77"/>
-      <p:regular r:id="rId22"/>
-      <p:bold r:id="rId23"/>
-      <p:italic r:id="rId24"/>
-      <p:boldItalic r:id="rId25"/>
+      <p:font typeface="Lato" panose="020B0604020202020204" charset="0"/>
+      <p:regular r:id="rId23"/>
+      <p:bold r:id="rId24"/>
+      <p:italic r:id="rId25"/>
+      <p:boldItalic r:id="rId26"/>
     </p:embeddedFont>
     <p:embeddedFont>
-      <p:font typeface="Raleway" pitchFamily="2" charset="77"/>
-      <p:regular r:id="rId26"/>
-      <p:bold r:id="rId27"/>
-      <p:italic r:id="rId28"/>
-      <p:boldItalic r:id="rId29"/>
+      <p:font typeface="Raleway" panose="020B0604020202020204" charset="0"/>
+      <p:regular r:id="rId27"/>
+      <p:bold r:id="rId28"/>
+      <p:italic r:id="rId29"/>
+      <p:boldItalic r:id="rId30"/>
     </p:embeddedFont>
   </p:embeddedFontLst>
   <p:defaultTextStyle>
@@ -297,7 +298,7 @@
 <file path=ppt/revisionInfo.xml><?xml version="1.0" encoding="utf-8"?>
 <p1510:revInfo xmlns:a="http://schemas.openxmlformats.org/drawingml/2006/main" xmlns:r="http://schemas.openxmlformats.org/officeDocument/2006/relationships" xmlns:p1510="http://schemas.microsoft.com/office/powerpoint/2015/10/main">
   <p1510:revLst>
-    <p1510:client id="{DBF0D679-A1D2-41BA-9DE5-196B1668C167}" v="1" dt="2020-07-20T00:39:20.959"/>
+    <p1510:client id="{DBF0D679-A1D2-41BA-9DE5-196B1668C167}" v="2" dt="2020-07-20T01:25:52.226"/>
   </p1510:revLst>
 </p1510:revInfo>
 </file>
@@ -307,7 +308,7 @@
   <pc:docChgLst>
     <pc:chgData name="Colin" userId="c2c872a862d4dd17" providerId="LiveId" clId="{DBF0D679-A1D2-41BA-9DE5-196B1668C167}"/>
     <pc:docChg chg="undo custSel addSld delSld modSld">
-      <pc:chgData name="Colin" userId="c2c872a862d4dd17" providerId="LiveId" clId="{DBF0D679-A1D2-41BA-9DE5-196B1668C167}" dt="2020-07-20T01:06:13.847" v="1033" actId="20577"/>
+      <pc:chgData name="Colin" userId="c2c872a862d4dd17" providerId="LiveId" clId="{DBF0D679-A1D2-41BA-9DE5-196B1668C167}" dt="2020-07-20T01:29:27.871" v="1659" actId="20577"/>
       <pc:docMkLst>
         <pc:docMk/>
       </pc:docMkLst>
@@ -342,11 +343,19 @@
         </pc:spChg>
       </pc:sldChg>
       <pc:sldChg chg="modSp mod">
-        <pc:chgData name="Colin" userId="c2c872a862d4dd17" providerId="LiveId" clId="{DBF0D679-A1D2-41BA-9DE5-196B1668C167}" dt="2020-07-20T00:48:17.574" v="266" actId="20577"/>
+        <pc:chgData name="Colin" userId="c2c872a862d4dd17" providerId="LiveId" clId="{DBF0D679-A1D2-41BA-9DE5-196B1668C167}" dt="2020-07-20T01:29:13.962" v="1655" actId="20577"/>
         <pc:sldMkLst>
           <pc:docMk/>
           <pc:sldMk cId="0" sldId="266"/>
         </pc:sldMkLst>
+        <pc:spChg chg="mod">
+          <ac:chgData name="Colin" userId="c2c872a862d4dd17" providerId="LiveId" clId="{DBF0D679-A1D2-41BA-9DE5-196B1668C167}" dt="2020-07-20T01:29:13.962" v="1655" actId="20577"/>
+          <ac:spMkLst>
+            <pc:docMk/>
+            <pc:sldMk cId="0" sldId="266"/>
+            <ac:spMk id="132" creationId="{00000000-0000-0000-0000-000000000000}"/>
+          </ac:spMkLst>
+        </pc:spChg>
         <pc:spChg chg="mod">
           <ac:chgData name="Colin" userId="c2c872a862d4dd17" providerId="LiveId" clId="{DBF0D679-A1D2-41BA-9DE5-196B1668C167}" dt="2020-07-20T00:48:17.574" v="266" actId="20577"/>
           <ac:spMkLst>
@@ -357,17 +366,40 @@
         </pc:spChg>
       </pc:sldChg>
       <pc:sldChg chg="addSp delSp modSp mod">
-        <pc:chgData name="Colin" userId="c2c872a862d4dd17" providerId="LiveId" clId="{DBF0D679-A1D2-41BA-9DE5-196B1668C167}" dt="2020-07-20T00:52:25.827" v="970" actId="20577"/>
+        <pc:chgData name="Colin" userId="c2c872a862d4dd17" providerId="LiveId" clId="{DBF0D679-A1D2-41BA-9DE5-196B1668C167}" dt="2020-07-20T01:29:09.303" v="1653" actId="20577"/>
         <pc:sldMkLst>
           <pc:docMk/>
           <pc:sldMk cId="0" sldId="267"/>
         </pc:sldMkLst>
+        <pc:spChg chg="mod">
+          <ac:chgData name="Colin" userId="c2c872a862d4dd17" providerId="LiveId" clId="{DBF0D679-A1D2-41BA-9DE5-196B1668C167}" dt="2020-07-20T01:29:09.303" v="1653" actId="20577"/>
+          <ac:spMkLst>
+            <pc:docMk/>
+            <pc:sldMk cId="0" sldId="267"/>
+            <ac:spMk id="138" creationId="{00000000-0000-0000-0000-000000000000}"/>
+          </ac:spMkLst>
+        </pc:spChg>
         <pc:spChg chg="add del mod">
           <ac:chgData name="Colin" userId="c2c872a862d4dd17" providerId="LiveId" clId="{DBF0D679-A1D2-41BA-9DE5-196B1668C167}" dt="2020-07-20T00:52:25.827" v="970" actId="20577"/>
           <ac:spMkLst>
             <pc:docMk/>
             <pc:sldMk cId="0" sldId="267"/>
             <ac:spMk id="139" creationId="{00000000-0000-0000-0000-000000000000}"/>
+          </ac:spMkLst>
+        </pc:spChg>
+      </pc:sldChg>
+      <pc:sldChg chg="modSp mod">
+        <pc:chgData name="Colin" userId="c2c872a862d4dd17" providerId="LiveId" clId="{DBF0D679-A1D2-41BA-9DE5-196B1668C167}" dt="2020-07-20T01:29:22.173" v="1657" actId="20577"/>
+        <pc:sldMkLst>
+          <pc:docMk/>
+          <pc:sldMk cId="0" sldId="268"/>
+        </pc:sldMkLst>
+        <pc:spChg chg="mod">
+          <ac:chgData name="Colin" userId="c2c872a862d4dd17" providerId="LiveId" clId="{DBF0D679-A1D2-41BA-9DE5-196B1668C167}" dt="2020-07-20T01:29:22.173" v="1657" actId="20577"/>
+          <ac:spMkLst>
+            <pc:docMk/>
+            <pc:sldMk cId="0" sldId="268"/>
+            <ac:spMk id="144" creationId="{00000000-0000-0000-0000-000000000000}"/>
           </ac:spMkLst>
         </pc:spChg>
       </pc:sldChg>
@@ -409,13 +441,13 @@
         </pc:spChg>
       </pc:sldChg>
       <pc:sldChg chg="addSp delSp modSp add mod">
-        <pc:chgData name="Colin" userId="c2c872a862d4dd17" providerId="LiveId" clId="{DBF0D679-A1D2-41BA-9DE5-196B1668C167}" dt="2020-07-20T00:40:55.321" v="30" actId="1076"/>
+        <pc:chgData name="Colin" userId="c2c872a862d4dd17" providerId="LiveId" clId="{DBF0D679-A1D2-41BA-9DE5-196B1668C167}" dt="2020-07-20T01:29:27.871" v="1659" actId="20577"/>
         <pc:sldMkLst>
           <pc:docMk/>
           <pc:sldMk cId="2138216353" sldId="275"/>
         </pc:sldMkLst>
         <pc:spChg chg="mod">
-          <ac:chgData name="Colin" userId="c2c872a862d4dd17" providerId="LiveId" clId="{DBF0D679-A1D2-41BA-9DE5-196B1668C167}" dt="2020-07-20T00:39:35.168" v="24" actId="20577"/>
+          <ac:chgData name="Colin" userId="c2c872a862d4dd17" providerId="LiveId" clId="{DBF0D679-A1D2-41BA-9DE5-196B1668C167}" dt="2020-07-20T01:29:27.871" v="1659" actId="20577"/>
           <ac:spMkLst>
             <pc:docMk/>
             <pc:sldMk cId="2138216353" sldId="275"/>
@@ -438,6 +470,29 @@
             <ac:picMk id="169" creationId="{00000000-0000-0000-0000-000000000000}"/>
           </ac:picMkLst>
         </pc:picChg>
+      </pc:sldChg>
+      <pc:sldChg chg="modSp add mod">
+        <pc:chgData name="Colin" userId="c2c872a862d4dd17" providerId="LiveId" clId="{DBF0D679-A1D2-41BA-9DE5-196B1668C167}" dt="2020-07-20T01:28:59.954" v="1651" actId="20577"/>
+        <pc:sldMkLst>
+          <pc:docMk/>
+          <pc:sldMk cId="1912523930" sldId="276"/>
+        </pc:sldMkLst>
+        <pc:spChg chg="mod">
+          <ac:chgData name="Colin" userId="c2c872a862d4dd17" providerId="LiveId" clId="{DBF0D679-A1D2-41BA-9DE5-196B1668C167}" dt="2020-07-20T01:26:13.491" v="1048" actId="20577"/>
+          <ac:spMkLst>
+            <pc:docMk/>
+            <pc:sldMk cId="1912523930" sldId="276"/>
+            <ac:spMk id="114" creationId="{00000000-0000-0000-0000-000000000000}"/>
+          </ac:spMkLst>
+        </pc:spChg>
+        <pc:spChg chg="mod">
+          <ac:chgData name="Colin" userId="c2c872a862d4dd17" providerId="LiveId" clId="{DBF0D679-A1D2-41BA-9DE5-196B1668C167}" dt="2020-07-20T01:28:59.954" v="1651" actId="20577"/>
+          <ac:spMkLst>
+            <pc:docMk/>
+            <pc:sldMk cId="1912523930" sldId="276"/>
+            <ac:spMk id="115" creationId="{00000000-0000-0000-0000-000000000000}"/>
+          </ac:spMkLst>
+        </pc:spChg>
       </pc:sldChg>
     </pc:docChg>
   </pc:docChgLst>
@@ -994,6 +1049,110 @@
   <p:cSld>
     <p:spTree>
       <p:nvGrpSpPr>
+        <p:cNvPr id="1" name="Shape 116"/>
+        <p:cNvGrpSpPr/>
+        <p:nvPr/>
+      </p:nvGrpSpPr>
+      <p:grpSpPr>
+        <a:xfrm>
+          <a:off x="0" y="0"/>
+          <a:ext cx="0" cy="0"/>
+          <a:chOff x="0" y="0"/>
+          <a:chExt cx="0" cy="0"/>
+        </a:xfrm>
+      </p:grpSpPr>
+      <p:sp>
+        <p:nvSpPr>
+          <p:cNvPr id="117" name="Google Shape;117;g8db37c88b9_0_24:notes"/>
+          <p:cNvSpPr>
+            <a:spLocks noGrp="1" noRot="1" noChangeAspect="1"/>
+          </p:cNvSpPr>
+          <p:nvPr>
+            <p:ph type="sldImg" idx="2"/>
+          </p:nvPr>
+        </p:nvSpPr>
+        <p:spPr>
+          <a:xfrm>
+            <a:off x="381000" y="685800"/>
+            <a:ext cx="6096000" cy="3429000"/>
+          </a:xfrm>
+          <a:custGeom>
+            <a:avLst/>
+            <a:gdLst/>
+            <a:ahLst/>
+            <a:cxnLst/>
+            <a:rect l="l" t="t" r="r" b="b"/>
+            <a:pathLst>
+              <a:path w="120000" h="120000" extrusionOk="0">
+                <a:moveTo>
+                  <a:pt x="0" y="0"/>
+                </a:moveTo>
+                <a:lnTo>
+                  <a:pt x="120000" y="0"/>
+                </a:lnTo>
+                <a:lnTo>
+                  <a:pt x="120000" y="120000"/>
+                </a:lnTo>
+                <a:lnTo>
+                  <a:pt x="0" y="120000"/>
+                </a:lnTo>
+                <a:close/>
+              </a:path>
+            </a:pathLst>
+          </a:custGeom>
+        </p:spPr>
+      </p:sp>
+      <p:sp>
+        <p:nvSpPr>
+          <p:cNvPr id="118" name="Google Shape;118;g8db37c88b9_0_24:notes"/>
+          <p:cNvSpPr txBox="1">
+            <a:spLocks noGrp="1"/>
+          </p:cNvSpPr>
+          <p:nvPr>
+            <p:ph type="body" idx="1"/>
+          </p:nvPr>
+        </p:nvSpPr>
+        <p:spPr>
+          <a:xfrm>
+            <a:off x="685800" y="4343400"/>
+            <a:ext cx="5486400" cy="4114800"/>
+          </a:xfrm>
+          <a:prstGeom prst="rect">
+            <a:avLst/>
+          </a:prstGeom>
+        </p:spPr>
+        <p:txBody>
+          <a:bodyPr spcFirstLastPara="1" wrap="square" lIns="91425" tIns="91425" rIns="91425" bIns="91425" anchor="t" anchorCtr="0">
+            <a:noAutofit/>
+          </a:bodyPr>
+          <a:lstStyle/>
+          <a:p>
+            <a:pPr marL="0" lvl="0" indent="0" algn="l" rtl="0">
+              <a:spcBef>
+                <a:spcPts val="0"/>
+              </a:spcBef>
+              <a:spcAft>
+                <a:spcPts val="0"/>
+              </a:spcAft>
+              <a:buNone/>
+            </a:pPr>
+            <a:endParaRPr/>
+          </a:p>
+        </p:txBody>
+      </p:sp>
+    </p:spTree>
+  </p:cSld>
+  <p:clrMapOvr>
+    <a:masterClrMapping/>
+  </p:clrMapOvr>
+</p:notes>
+</file>
+
+<file path=ppt/notesSlides/notesSlide11.xml><?xml version="1.0" encoding="utf-8"?>
+<p:notes xmlns:a="http://schemas.openxmlformats.org/drawingml/2006/main" xmlns:r="http://schemas.openxmlformats.org/officeDocument/2006/relationships" xmlns:p="http://schemas.openxmlformats.org/presentationml/2006/main" showMasterSp="0" showMasterPhAnim="0">
+  <p:cSld>
+    <p:spTree>
+      <p:nvGrpSpPr>
         <p:cNvPr id="1" name="Shape 122"/>
         <p:cNvGrpSpPr/>
         <p:nvPr/>
@@ -1093,7 +1252,7 @@
 </p:notes>
 </file>
 
-<file path=ppt/notesSlides/notesSlide11.xml><?xml version="1.0" encoding="utf-8"?>
+<file path=ppt/notesSlides/notesSlide12.xml><?xml version="1.0" encoding="utf-8"?>
 <p:notes xmlns:a="http://schemas.openxmlformats.org/drawingml/2006/main" xmlns:r="http://schemas.openxmlformats.org/officeDocument/2006/relationships" xmlns:p="http://schemas.openxmlformats.org/presentationml/2006/main" showMasterSp="0" showMasterPhAnim="0">
   <p:cSld>
     <p:spTree>
@@ -1197,7 +1356,7 @@
 </p:notes>
 </file>
 
-<file path=ppt/notesSlides/notesSlide12.xml><?xml version="1.0" encoding="utf-8"?>
+<file path=ppt/notesSlides/notesSlide13.xml><?xml version="1.0" encoding="utf-8"?>
 <p:notes xmlns:a="http://schemas.openxmlformats.org/drawingml/2006/main" xmlns:r="http://schemas.openxmlformats.org/officeDocument/2006/relationships" xmlns:p="http://schemas.openxmlformats.org/presentationml/2006/main" showMasterSp="0" showMasterPhAnim="0">
   <p:cSld>
     <p:spTree>
@@ -1301,7 +1460,7 @@
 </p:notes>
 </file>
 
-<file path=ppt/notesSlides/notesSlide13.xml><?xml version="1.0" encoding="utf-8"?>
+<file path=ppt/notesSlides/notesSlide14.xml><?xml version="1.0" encoding="utf-8"?>
 <p:notes xmlns:a="http://schemas.openxmlformats.org/drawingml/2006/main" xmlns:r="http://schemas.openxmlformats.org/officeDocument/2006/relationships" xmlns:p="http://schemas.openxmlformats.org/presentationml/2006/main" showMasterSp="0" showMasterPhAnim="0">
   <p:cSld>
     <p:spTree>
@@ -1330,7 +1489,7 @@
         </p:nvSpPr>
         <p:spPr>
           <a:xfrm>
-            <a:off x="381300" y="685800"/>
+            <a:off x="381000" y="685800"/>
             <a:ext cx="6096000" cy="3429000"/>
           </a:xfrm>
           <a:custGeom>
@@ -1405,7 +1564,7 @@
 </p:notes>
 </file>
 
-<file path=ppt/notesSlides/notesSlide14.xml><?xml version="1.0" encoding="utf-8"?>
+<file path=ppt/notesSlides/notesSlide15.xml><?xml version="1.0" encoding="utf-8"?>
 <p:notes xmlns:a="http://schemas.openxmlformats.org/drawingml/2006/main" xmlns:r="http://schemas.openxmlformats.org/officeDocument/2006/relationships" xmlns:p="http://schemas.openxmlformats.org/presentationml/2006/main" showMasterSp="0" showMasterPhAnim="0">
   <p:cSld>
     <p:spTree>
@@ -1509,7 +1668,7 @@
 </p:notes>
 </file>
 
-<file path=ppt/notesSlides/notesSlide15.xml><?xml version="1.0" encoding="utf-8"?>
+<file path=ppt/notesSlides/notesSlide16.xml><?xml version="1.0" encoding="utf-8"?>
 <p:notes xmlns:a="http://schemas.openxmlformats.org/drawingml/2006/main" xmlns:r="http://schemas.openxmlformats.org/officeDocument/2006/relationships" xmlns:p="http://schemas.openxmlformats.org/presentationml/2006/main" showMasterSp="0" showMasterPhAnim="0">
   <p:cSld>
     <p:spTree>
@@ -1570,110 +1729,6 @@
       <p:sp>
         <p:nvSpPr>
           <p:cNvPr id="160" name="Google Shape;160;g8db37c88b9_0_74:notes"/>
-          <p:cNvSpPr txBox="1">
-            <a:spLocks noGrp="1"/>
-          </p:cNvSpPr>
-          <p:nvPr>
-            <p:ph type="body" idx="1"/>
-          </p:nvPr>
-        </p:nvSpPr>
-        <p:spPr>
-          <a:xfrm>
-            <a:off x="685800" y="4343400"/>
-            <a:ext cx="5486400" cy="4114800"/>
-          </a:xfrm>
-          <a:prstGeom prst="rect">
-            <a:avLst/>
-          </a:prstGeom>
-        </p:spPr>
-        <p:txBody>
-          <a:bodyPr spcFirstLastPara="1" wrap="square" lIns="91425" tIns="91425" rIns="91425" bIns="91425" anchor="t" anchorCtr="0">
-            <a:noAutofit/>
-          </a:bodyPr>
-          <a:lstStyle/>
-          <a:p>
-            <a:pPr marL="0" lvl="0" indent="0" algn="l" rtl="0">
-              <a:spcBef>
-                <a:spcPts val="0"/>
-              </a:spcBef>
-              <a:spcAft>
-                <a:spcPts val="0"/>
-              </a:spcAft>
-              <a:buNone/>
-            </a:pPr>
-            <a:endParaRPr/>
-          </a:p>
-        </p:txBody>
-      </p:sp>
-    </p:spTree>
-  </p:cSld>
-  <p:clrMapOvr>
-    <a:masterClrMapping/>
-  </p:clrMapOvr>
-</p:notes>
-</file>
-
-<file path=ppt/notesSlides/notesSlide16.xml><?xml version="1.0" encoding="utf-8"?>
-<p:notes xmlns:a="http://schemas.openxmlformats.org/drawingml/2006/main" xmlns:r="http://schemas.openxmlformats.org/officeDocument/2006/relationships" xmlns:p="http://schemas.openxmlformats.org/presentationml/2006/main" showMasterSp="0" showMasterPhAnim="0">
-  <p:cSld>
-    <p:spTree>
-      <p:nvGrpSpPr>
-        <p:cNvPr id="1" name="Shape 164"/>
-        <p:cNvGrpSpPr/>
-        <p:nvPr/>
-      </p:nvGrpSpPr>
-      <p:grpSpPr>
-        <a:xfrm>
-          <a:off x="0" y="0"/>
-          <a:ext cx="0" cy="0"/>
-          <a:chOff x="0" y="0"/>
-          <a:chExt cx="0" cy="0"/>
-        </a:xfrm>
-      </p:grpSpPr>
-      <p:sp>
-        <p:nvSpPr>
-          <p:cNvPr id="165" name="Google Shape;165;g8db37c88b9_0_69:notes"/>
-          <p:cNvSpPr>
-            <a:spLocks noGrp="1" noRot="1" noChangeAspect="1"/>
-          </p:cNvSpPr>
-          <p:nvPr>
-            <p:ph type="sldImg" idx="2"/>
-          </p:nvPr>
-        </p:nvSpPr>
-        <p:spPr>
-          <a:xfrm>
-            <a:off x="381000" y="685800"/>
-            <a:ext cx="6096000" cy="3429000"/>
-          </a:xfrm>
-          <a:custGeom>
-            <a:avLst/>
-            <a:gdLst/>
-            <a:ahLst/>
-            <a:cxnLst/>
-            <a:rect l="l" t="t" r="r" b="b"/>
-            <a:pathLst>
-              <a:path w="120000" h="120000" extrusionOk="0">
-                <a:moveTo>
-                  <a:pt x="0" y="0"/>
-                </a:moveTo>
-                <a:lnTo>
-                  <a:pt x="120000" y="0"/>
-                </a:lnTo>
-                <a:lnTo>
-                  <a:pt x="120000" y="120000"/>
-                </a:lnTo>
-                <a:lnTo>
-                  <a:pt x="0" y="120000"/>
-                </a:lnTo>
-                <a:close/>
-              </a:path>
-            </a:pathLst>
-          </a:custGeom>
-        </p:spPr>
-      </p:sp>
-      <p:sp>
-        <p:nvSpPr>
-          <p:cNvPr id="166" name="Google Shape;166;g8db37c88b9_0_69:notes"/>
           <p:cNvSpPr txBox="1">
             <a:spLocks noGrp="1"/>
           </p:cNvSpPr>
@@ -1814,6 +1869,110 @@
         </p:txBody>
       </p:sp>
     </p:spTree>
+  </p:cSld>
+  <p:clrMapOvr>
+    <a:masterClrMapping/>
+  </p:clrMapOvr>
+</p:notes>
+</file>
+
+<file path=ppt/notesSlides/notesSlide18.xml><?xml version="1.0" encoding="utf-8"?>
+<p:notes xmlns:a="http://schemas.openxmlformats.org/drawingml/2006/main" xmlns:r="http://schemas.openxmlformats.org/officeDocument/2006/relationships" xmlns:p="http://schemas.openxmlformats.org/presentationml/2006/main" showMasterSp="0" showMasterPhAnim="0">
+  <p:cSld>
+    <p:spTree>
+      <p:nvGrpSpPr>
+        <p:cNvPr id="1" name="Shape 164"/>
+        <p:cNvGrpSpPr/>
+        <p:nvPr/>
+      </p:nvGrpSpPr>
+      <p:grpSpPr>
+        <a:xfrm>
+          <a:off x="0" y="0"/>
+          <a:ext cx="0" cy="0"/>
+          <a:chOff x="0" y="0"/>
+          <a:chExt cx="0" cy="0"/>
+        </a:xfrm>
+      </p:grpSpPr>
+      <p:sp>
+        <p:nvSpPr>
+          <p:cNvPr id="165" name="Google Shape;165;g8db37c88b9_0_69:notes"/>
+          <p:cNvSpPr>
+            <a:spLocks noGrp="1" noRot="1" noChangeAspect="1"/>
+          </p:cNvSpPr>
+          <p:nvPr>
+            <p:ph type="sldImg" idx="2"/>
+          </p:nvPr>
+        </p:nvSpPr>
+        <p:spPr>
+          <a:xfrm>
+            <a:off x="381000" y="685800"/>
+            <a:ext cx="6096000" cy="3429000"/>
+          </a:xfrm>
+          <a:custGeom>
+            <a:avLst/>
+            <a:gdLst/>
+            <a:ahLst/>
+            <a:cxnLst/>
+            <a:rect l="l" t="t" r="r" b="b"/>
+            <a:pathLst>
+              <a:path w="120000" h="120000" extrusionOk="0">
+                <a:moveTo>
+                  <a:pt x="0" y="0"/>
+                </a:moveTo>
+                <a:lnTo>
+                  <a:pt x="120000" y="0"/>
+                </a:lnTo>
+                <a:lnTo>
+                  <a:pt x="120000" y="120000"/>
+                </a:lnTo>
+                <a:lnTo>
+                  <a:pt x="0" y="120000"/>
+                </a:lnTo>
+                <a:close/>
+              </a:path>
+            </a:pathLst>
+          </a:custGeom>
+        </p:spPr>
+      </p:sp>
+      <p:sp>
+        <p:nvSpPr>
+          <p:cNvPr id="166" name="Google Shape;166;g8db37c88b9_0_69:notes"/>
+          <p:cNvSpPr txBox="1">
+            <a:spLocks noGrp="1"/>
+          </p:cNvSpPr>
+          <p:nvPr>
+            <p:ph type="body" idx="1"/>
+          </p:nvPr>
+        </p:nvSpPr>
+        <p:spPr>
+          <a:xfrm>
+            <a:off x="685800" y="4343400"/>
+            <a:ext cx="5486400" cy="4114800"/>
+          </a:xfrm>
+          <a:prstGeom prst="rect">
+            <a:avLst/>
+          </a:prstGeom>
+        </p:spPr>
+        <p:txBody>
+          <a:bodyPr spcFirstLastPara="1" wrap="square" lIns="91425" tIns="91425" rIns="91425" bIns="91425" anchor="t" anchorCtr="0">
+            <a:noAutofit/>
+          </a:bodyPr>
+          <a:lstStyle/>
+          <a:p>
+            <a:pPr marL="0" lvl="0" indent="0" algn="l" rtl="0">
+              <a:spcBef>
+                <a:spcPts val="0"/>
+              </a:spcBef>
+              <a:spcAft>
+                <a:spcPts val="0"/>
+              </a:spcAft>
+              <a:buNone/>
+            </a:pPr>
+            <a:endParaRPr/>
+          </a:p>
+        </p:txBody>
+      </p:sp>
+    </p:spTree>
     <p:extLst>
       <p:ext uri="{BB962C8B-B14F-4D97-AF65-F5344CB8AC3E}">
         <p14:creationId xmlns:p14="http://schemas.microsoft.com/office/powerpoint/2010/main" val="2055091841"/>
@@ -1826,7 +1985,7 @@
 </p:notes>
 </file>
 
-<file path=ppt/notesSlides/notesSlide18.xml><?xml version="1.0" encoding="utf-8"?>
+<file path=ppt/notesSlides/notesSlide19.xml><?xml version="1.0" encoding="utf-8"?>
 <p:notes xmlns:a="http://schemas.openxmlformats.org/drawingml/2006/main" xmlns:r="http://schemas.openxmlformats.org/officeDocument/2006/relationships" xmlns:p="http://schemas.openxmlformats.org/presentationml/2006/main" showMasterSp="0" showMasterPhAnim="0">
   <p:cSld>
     <p:spTree>
@@ -1887,110 +2046,6 @@
       <p:sp>
         <p:nvSpPr>
           <p:cNvPr id="172" name="Google Shape;172;g8db37c88b9_0_79:notes"/>
-          <p:cNvSpPr txBox="1">
-            <a:spLocks noGrp="1"/>
-          </p:cNvSpPr>
-          <p:nvPr>
-            <p:ph type="body" idx="1"/>
-          </p:nvPr>
-        </p:nvSpPr>
-        <p:spPr>
-          <a:xfrm>
-            <a:off x="685800" y="4343400"/>
-            <a:ext cx="5486400" cy="4114800"/>
-          </a:xfrm>
-          <a:prstGeom prst="rect">
-            <a:avLst/>
-          </a:prstGeom>
-        </p:spPr>
-        <p:txBody>
-          <a:bodyPr spcFirstLastPara="1" wrap="square" lIns="91425" tIns="91425" rIns="91425" bIns="91425" anchor="t" anchorCtr="0">
-            <a:noAutofit/>
-          </a:bodyPr>
-          <a:lstStyle/>
-          <a:p>
-            <a:pPr marL="0" lvl="0" indent="0" algn="l" rtl="0">
-              <a:spcBef>
-                <a:spcPts val="0"/>
-              </a:spcBef>
-              <a:spcAft>
-                <a:spcPts val="0"/>
-              </a:spcAft>
-              <a:buNone/>
-            </a:pPr>
-            <a:endParaRPr/>
-          </a:p>
-        </p:txBody>
-      </p:sp>
-    </p:spTree>
-  </p:cSld>
-  <p:clrMapOvr>
-    <a:masterClrMapping/>
-  </p:clrMapOvr>
-</p:notes>
-</file>
-
-<file path=ppt/notesSlides/notesSlide19.xml><?xml version="1.0" encoding="utf-8"?>
-<p:notes xmlns:a="http://schemas.openxmlformats.org/drawingml/2006/main" xmlns:r="http://schemas.openxmlformats.org/officeDocument/2006/relationships" xmlns:p="http://schemas.openxmlformats.org/presentationml/2006/main" showMasterSp="0" showMasterPhAnim="0">
-  <p:cSld>
-    <p:spTree>
-      <p:nvGrpSpPr>
-        <p:cNvPr id="1" name="Shape 176"/>
-        <p:cNvGrpSpPr/>
-        <p:nvPr/>
-      </p:nvGrpSpPr>
-      <p:grpSpPr>
-        <a:xfrm>
-          <a:off x="0" y="0"/>
-          <a:ext cx="0" cy="0"/>
-          <a:chOff x="0" y="0"/>
-          <a:chExt cx="0" cy="0"/>
-        </a:xfrm>
-      </p:grpSpPr>
-      <p:sp>
-        <p:nvSpPr>
-          <p:cNvPr id="177" name="Google Shape;177;g8db37c88b9_0_84:notes"/>
-          <p:cNvSpPr>
-            <a:spLocks noGrp="1" noRot="1" noChangeAspect="1"/>
-          </p:cNvSpPr>
-          <p:nvPr>
-            <p:ph type="sldImg" idx="2"/>
-          </p:nvPr>
-        </p:nvSpPr>
-        <p:spPr>
-          <a:xfrm>
-            <a:off x="381300" y="685800"/>
-            <a:ext cx="6096000" cy="3429000"/>
-          </a:xfrm>
-          <a:custGeom>
-            <a:avLst/>
-            <a:gdLst/>
-            <a:ahLst/>
-            <a:cxnLst/>
-            <a:rect l="l" t="t" r="r" b="b"/>
-            <a:pathLst>
-              <a:path w="120000" h="120000" extrusionOk="0">
-                <a:moveTo>
-                  <a:pt x="0" y="0"/>
-                </a:moveTo>
-                <a:lnTo>
-                  <a:pt x="120000" y="0"/>
-                </a:lnTo>
-                <a:lnTo>
-                  <a:pt x="120000" y="120000"/>
-                </a:lnTo>
-                <a:lnTo>
-                  <a:pt x="0" y="120000"/>
-                </a:lnTo>
-                <a:close/>
-              </a:path>
-            </a:pathLst>
-          </a:custGeom>
-        </p:spPr>
-      </p:sp>
-      <p:sp>
-        <p:nvSpPr>
-          <p:cNvPr id="178" name="Google Shape;178;g8db37c88b9_0_84:notes"/>
           <p:cNvSpPr txBox="1">
             <a:spLocks noGrp="1"/>
           </p:cNvSpPr>
@@ -2138,6 +2193,110 @@
 </p:notes>
 </file>
 
+<file path=ppt/notesSlides/notesSlide20.xml><?xml version="1.0" encoding="utf-8"?>
+<p:notes xmlns:a="http://schemas.openxmlformats.org/drawingml/2006/main" xmlns:r="http://schemas.openxmlformats.org/officeDocument/2006/relationships" xmlns:p="http://schemas.openxmlformats.org/presentationml/2006/main" showMasterSp="0" showMasterPhAnim="0">
+  <p:cSld>
+    <p:spTree>
+      <p:nvGrpSpPr>
+        <p:cNvPr id="1" name="Shape 176"/>
+        <p:cNvGrpSpPr/>
+        <p:nvPr/>
+      </p:nvGrpSpPr>
+      <p:grpSpPr>
+        <a:xfrm>
+          <a:off x="0" y="0"/>
+          <a:ext cx="0" cy="0"/>
+          <a:chOff x="0" y="0"/>
+          <a:chExt cx="0" cy="0"/>
+        </a:xfrm>
+      </p:grpSpPr>
+      <p:sp>
+        <p:nvSpPr>
+          <p:cNvPr id="177" name="Google Shape;177;g8db37c88b9_0_84:notes"/>
+          <p:cNvSpPr>
+            <a:spLocks noGrp="1" noRot="1" noChangeAspect="1"/>
+          </p:cNvSpPr>
+          <p:nvPr>
+            <p:ph type="sldImg" idx="2"/>
+          </p:nvPr>
+        </p:nvSpPr>
+        <p:spPr>
+          <a:xfrm>
+            <a:off x="381300" y="685800"/>
+            <a:ext cx="6096000" cy="3429000"/>
+          </a:xfrm>
+          <a:custGeom>
+            <a:avLst/>
+            <a:gdLst/>
+            <a:ahLst/>
+            <a:cxnLst/>
+            <a:rect l="l" t="t" r="r" b="b"/>
+            <a:pathLst>
+              <a:path w="120000" h="120000" extrusionOk="0">
+                <a:moveTo>
+                  <a:pt x="0" y="0"/>
+                </a:moveTo>
+                <a:lnTo>
+                  <a:pt x="120000" y="0"/>
+                </a:lnTo>
+                <a:lnTo>
+                  <a:pt x="120000" y="120000"/>
+                </a:lnTo>
+                <a:lnTo>
+                  <a:pt x="0" y="120000"/>
+                </a:lnTo>
+                <a:close/>
+              </a:path>
+            </a:pathLst>
+          </a:custGeom>
+        </p:spPr>
+      </p:sp>
+      <p:sp>
+        <p:nvSpPr>
+          <p:cNvPr id="178" name="Google Shape;178;g8db37c88b9_0_84:notes"/>
+          <p:cNvSpPr txBox="1">
+            <a:spLocks noGrp="1"/>
+          </p:cNvSpPr>
+          <p:nvPr>
+            <p:ph type="body" idx="1"/>
+          </p:nvPr>
+        </p:nvSpPr>
+        <p:spPr>
+          <a:xfrm>
+            <a:off x="685800" y="4343400"/>
+            <a:ext cx="5486400" cy="4114800"/>
+          </a:xfrm>
+          <a:prstGeom prst="rect">
+            <a:avLst/>
+          </a:prstGeom>
+        </p:spPr>
+        <p:txBody>
+          <a:bodyPr spcFirstLastPara="1" wrap="square" lIns="91425" tIns="91425" rIns="91425" bIns="91425" anchor="t" anchorCtr="0">
+            <a:noAutofit/>
+          </a:bodyPr>
+          <a:lstStyle/>
+          <a:p>
+            <a:pPr marL="0" lvl="0" indent="0" algn="l" rtl="0">
+              <a:spcBef>
+                <a:spcPts val="0"/>
+              </a:spcBef>
+              <a:spcAft>
+                <a:spcPts val="0"/>
+              </a:spcAft>
+              <a:buNone/>
+            </a:pPr>
+            <a:endParaRPr/>
+          </a:p>
+        </p:txBody>
+      </p:sp>
+    </p:spTree>
+  </p:cSld>
+  <p:clrMapOvr>
+    <a:masterClrMapping/>
+  </p:clrMapOvr>
+</p:notes>
+</file>
+
 <file path=ppt/notesSlides/notesSlide3.xml><?xml version="1.0" encoding="utf-8"?>
 <p:notes xmlns:a="http://schemas.openxmlformats.org/drawingml/2006/main" xmlns:r="http://schemas.openxmlformats.org/officeDocument/2006/relationships" xmlns:p="http://schemas.openxmlformats.org/presentationml/2006/main" showMasterSp="0" showMasterPhAnim="0">
   <p:cSld>
@@ -2767,7 +2926,7 @@
   <p:cSld>
     <p:spTree>
       <p:nvGrpSpPr>
-        <p:cNvPr id="1" name="Shape 116"/>
+        <p:cNvPr id="1" name="Shape 110"/>
         <p:cNvGrpSpPr/>
         <p:nvPr/>
       </p:nvGrpSpPr>
@@ -2781,7 +2940,7 @@
       </p:grpSpPr>
       <p:sp>
         <p:nvSpPr>
-          <p:cNvPr id="117" name="Google Shape;117;g8db37c88b9_0_24:notes"/>
+          <p:cNvPr id="111" name="Google Shape;111;g8db37c88b9_0_39:notes"/>
           <p:cNvSpPr>
             <a:spLocks noGrp="1" noRot="1" noChangeAspect="1"/>
           </p:cNvSpPr>
@@ -2822,7 +2981,7 @@
       </p:sp>
       <p:sp>
         <p:nvSpPr>
-          <p:cNvPr id="118" name="Google Shape;118;g8db37c88b9_0_24:notes"/>
+          <p:cNvPr id="112" name="Google Shape;112;g8db37c88b9_0_39:notes"/>
           <p:cNvSpPr txBox="1">
             <a:spLocks noGrp="1"/>
           </p:cNvSpPr>
@@ -2859,6 +3018,11 @@
         </p:txBody>
       </p:sp>
     </p:spTree>
+    <p:extLst>
+      <p:ext uri="{BB962C8B-B14F-4D97-AF65-F5344CB8AC3E}">
+        <p14:creationId xmlns:p14="http://schemas.microsoft.com/office/powerpoint/2010/main" val="3899986916"/>
+      </p:ext>
+    </p:extLst>
   </p:cSld>
   <p:clrMapOvr>
     <a:masterClrMapping/>
@@ -8960,6 +9124,484 @@
   <p:cSld>
     <p:spTree>
       <p:nvGrpSpPr>
+        <p:cNvPr id="1" name="Shape 119"/>
+        <p:cNvGrpSpPr/>
+        <p:nvPr/>
+      </p:nvGrpSpPr>
+      <p:grpSpPr>
+        <a:xfrm>
+          <a:off x="0" y="0"/>
+          <a:ext cx="0" cy="0"/>
+          <a:chOff x="0" y="0"/>
+          <a:chExt cx="0" cy="0"/>
+        </a:xfrm>
+      </p:grpSpPr>
+      <p:sp>
+        <p:nvSpPr>
+          <p:cNvPr id="120" name="Google Shape;120;p21"/>
+          <p:cNvSpPr txBox="1">
+            <a:spLocks noGrp="1"/>
+          </p:cNvSpPr>
+          <p:nvPr>
+            <p:ph type="title"/>
+          </p:nvPr>
+        </p:nvSpPr>
+        <p:spPr>
+          <a:xfrm>
+            <a:off x="303300" y="193225"/>
+            <a:ext cx="8520600" cy="639600"/>
+          </a:xfrm>
+          <a:prstGeom prst="rect">
+            <a:avLst/>
+          </a:prstGeom>
+        </p:spPr>
+        <p:txBody>
+          <a:bodyPr spcFirstLastPara="1" wrap="square" lIns="91425" tIns="91425" rIns="91425" bIns="91425" anchor="t" anchorCtr="0">
+            <a:noAutofit/>
+          </a:bodyPr>
+          <a:lstStyle/>
+          <a:p>
+            <a:pPr marL="0" lvl="0" indent="0" algn="l" rtl="0">
+              <a:spcBef>
+                <a:spcPts val="0"/>
+              </a:spcBef>
+              <a:spcAft>
+                <a:spcPts val="0"/>
+              </a:spcAft>
+              <a:buNone/>
+            </a:pPr>
+            <a:r>
+              <a:rPr lang="en" sz="3600">
+                <a:solidFill>
+                  <a:srgbClr val="FFFFFF"/>
+                </a:solidFill>
+              </a:rPr>
+              <a:t>What is in the HTML?</a:t>
+            </a:r>
+            <a:endParaRPr sz="3600">
+              <a:solidFill>
+                <a:srgbClr val="FFFFFF"/>
+              </a:solidFill>
+            </a:endParaRPr>
+          </a:p>
+        </p:txBody>
+      </p:sp>
+      <p:sp>
+        <p:nvSpPr>
+          <p:cNvPr id="121" name="Google Shape;121;p21"/>
+          <p:cNvSpPr txBox="1"/>
+          <p:nvPr/>
+        </p:nvSpPr>
+        <p:spPr>
+          <a:xfrm>
+            <a:off x="303300" y="1819625"/>
+            <a:ext cx="8520600" cy="2899200"/>
+          </a:xfrm>
+          <a:prstGeom prst="rect">
+            <a:avLst/>
+          </a:prstGeom>
+          <a:noFill/>
+          <a:ln>
+            <a:noFill/>
+          </a:ln>
+        </p:spPr>
+        <p:txBody>
+          <a:bodyPr spcFirstLastPara="1" wrap="square" lIns="91425" tIns="91425" rIns="91425" bIns="91425" anchor="t" anchorCtr="0">
+            <a:noAutofit/>
+          </a:bodyPr>
+          <a:lstStyle/>
+          <a:p>
+            <a:pPr marL="0" lvl="0" indent="0" algn="l" rtl="0">
+              <a:spcBef>
+                <a:spcPts val="0"/>
+              </a:spcBef>
+              <a:spcAft>
+                <a:spcPts val="0"/>
+              </a:spcAft>
+              <a:buNone/>
+            </a:pPr>
+            <a:br>
+              <a:rPr lang="en" sz="1700" dirty="0">
+                <a:solidFill>
+                  <a:srgbClr val="FFFFFF"/>
+                </a:solidFill>
+                <a:latin typeface="Lato"/>
+                <a:ea typeface="Lato"/>
+                <a:cs typeface="Lato"/>
+                <a:sym typeface="Lato"/>
+              </a:rPr>
+            </a:br>
+            <a:r>
+              <a:rPr lang="en" sz="1700" dirty="0" err="1">
+                <a:solidFill>
+                  <a:srgbClr val="FFFFFF"/>
+                </a:solidFill>
+                <a:latin typeface="Lato"/>
+                <a:ea typeface="Lato"/>
+                <a:cs typeface="Lato"/>
+                <a:sym typeface="Lato"/>
+              </a:rPr>
+              <a:t>BootStrap</a:t>
+            </a:r>
+            <a:r>
+              <a:rPr lang="en" sz="1700" dirty="0">
+                <a:solidFill>
+                  <a:srgbClr val="FFFFFF"/>
+                </a:solidFill>
+                <a:latin typeface="Lato"/>
+                <a:ea typeface="Lato"/>
+                <a:cs typeface="Lato"/>
+                <a:sym typeface="Lato"/>
+              </a:rPr>
+              <a:t>: </a:t>
+            </a:r>
+            <a:r>
+              <a:rPr lang="en" sz="1700" dirty="0">
+                <a:solidFill>
+                  <a:schemeClr val="bg1"/>
+                </a:solidFill>
+                <a:uFill>
+                  <a:noFill/>
+                </a:uFill>
+                <a:latin typeface="Lato"/>
+                <a:ea typeface="Lato"/>
+                <a:cs typeface="Lato"/>
+                <a:sym typeface="Lato"/>
+                <a:hlinkClick r:id="rId3">
+                  <a:extLst>
+                    <a:ext uri="{A12FA001-AC4F-418D-AE19-62706E023703}">
+                      <ahyp:hlinkClr xmlns:ahyp="http://schemas.microsoft.com/office/drawing/2018/hyperlinkcolor" val="tx"/>
+                    </a:ext>
+                  </a:extLst>
+                </a:hlinkClick>
+              </a:rPr>
+              <a:t>https://maxcdn.bootstrapcdn.com/bootstrap/3.3.7/css/bootstrap.min.css</a:t>
+            </a:r>
+            <a:br>
+              <a:rPr lang="en" sz="1700" dirty="0">
+                <a:solidFill>
+                  <a:srgbClr val="FFFFFF"/>
+                </a:solidFill>
+                <a:latin typeface="Lato"/>
+                <a:ea typeface="Lato"/>
+                <a:cs typeface="Lato"/>
+                <a:sym typeface="Lato"/>
+              </a:rPr>
+            </a:br>
+            <a:r>
+              <a:rPr lang="en" sz="1700" dirty="0">
+                <a:solidFill>
+                  <a:srgbClr val="FFFFFF"/>
+                </a:solidFill>
+                <a:latin typeface="Lato"/>
+                <a:ea typeface="Lato"/>
+                <a:cs typeface="Lato"/>
+                <a:sym typeface="Lato"/>
+              </a:rPr>
+              <a:t>D3: </a:t>
+            </a:r>
+            <a:r>
+              <a:rPr lang="en" sz="1700" dirty="0">
+                <a:solidFill>
+                  <a:schemeClr val="bg1"/>
+                </a:solidFill>
+                <a:uFill>
+                  <a:noFill/>
+                </a:uFill>
+                <a:latin typeface="Lato"/>
+                <a:ea typeface="Lato"/>
+                <a:cs typeface="Lato"/>
+                <a:sym typeface="Lato"/>
+                <a:hlinkClick r:id="rId4">
+                  <a:extLst>
+                    <a:ext uri="{A12FA001-AC4F-418D-AE19-62706E023703}">
+                      <ahyp:hlinkClr xmlns:ahyp="http://schemas.microsoft.com/office/drawing/2018/hyperlinkcolor" val="tx"/>
+                    </a:ext>
+                  </a:extLst>
+                </a:hlinkClick>
+              </a:rPr>
+              <a:t>https://cdnjs.cloudflare.com/ajax/libs/d3/5.5.0/d3.js</a:t>
+            </a:r>
+            <a:br>
+              <a:rPr lang="en" sz="1700" dirty="0">
+                <a:solidFill>
+                  <a:srgbClr val="FFFFFF"/>
+                </a:solidFill>
+                <a:latin typeface="Lato"/>
+                <a:ea typeface="Lato"/>
+                <a:cs typeface="Lato"/>
+                <a:sym typeface="Lato"/>
+              </a:rPr>
+            </a:br>
+            <a:r>
+              <a:rPr lang="en" sz="1700" dirty="0">
+                <a:solidFill>
+                  <a:srgbClr val="FFFFFF"/>
+                </a:solidFill>
+                <a:latin typeface="Lato"/>
+                <a:ea typeface="Lato"/>
+                <a:cs typeface="Lato"/>
+                <a:sym typeface="Lato"/>
+              </a:rPr>
+              <a:t>CSS: static/</a:t>
+            </a:r>
+            <a:r>
+              <a:rPr lang="en" sz="1700" dirty="0" err="1">
+                <a:solidFill>
+                  <a:srgbClr val="FFFFFF"/>
+                </a:solidFill>
+                <a:latin typeface="Lato"/>
+                <a:ea typeface="Lato"/>
+                <a:cs typeface="Lato"/>
+                <a:sym typeface="Lato"/>
+              </a:rPr>
+              <a:t>css</a:t>
+            </a:r>
+            <a:r>
+              <a:rPr lang="en" sz="1700" dirty="0">
+                <a:solidFill>
+                  <a:srgbClr val="FFFFFF"/>
+                </a:solidFill>
+                <a:latin typeface="Lato"/>
+                <a:ea typeface="Lato"/>
+                <a:cs typeface="Lato"/>
+                <a:sym typeface="Lato"/>
+              </a:rPr>
+              <a:t>/</a:t>
+            </a:r>
+            <a:r>
+              <a:rPr lang="en" sz="1700" dirty="0" err="1">
+                <a:solidFill>
+                  <a:srgbClr val="FFFFFF"/>
+                </a:solidFill>
+                <a:latin typeface="Lato"/>
+                <a:ea typeface="Lato"/>
+                <a:cs typeface="Lato"/>
+                <a:sym typeface="Lato"/>
+              </a:rPr>
+              <a:t>style.css</a:t>
+            </a:r>
+            <a:br>
+              <a:rPr lang="en" sz="1700" dirty="0">
+                <a:solidFill>
+                  <a:srgbClr val="FFFFFF"/>
+                </a:solidFill>
+                <a:latin typeface="Lato"/>
+                <a:ea typeface="Lato"/>
+                <a:cs typeface="Lato"/>
+                <a:sym typeface="Lato"/>
+              </a:rPr>
+            </a:br>
+            <a:r>
+              <a:rPr lang="en" sz="1700" dirty="0">
+                <a:solidFill>
+                  <a:srgbClr val="FFFFFF"/>
+                </a:solidFill>
+                <a:latin typeface="Lato"/>
+                <a:ea typeface="Lato"/>
+                <a:cs typeface="Lato"/>
+                <a:sym typeface="Lato"/>
+              </a:rPr>
+              <a:t>Leaflet CSS: https://</a:t>
+            </a:r>
+            <a:r>
+              <a:rPr lang="en" sz="1700" dirty="0" err="1">
+                <a:solidFill>
+                  <a:srgbClr val="FFFFFF"/>
+                </a:solidFill>
+                <a:latin typeface="Lato"/>
+                <a:ea typeface="Lato"/>
+                <a:cs typeface="Lato"/>
+                <a:sym typeface="Lato"/>
+              </a:rPr>
+              <a:t>unpkg.com</a:t>
+            </a:r>
+            <a:r>
+              <a:rPr lang="en" sz="1700" dirty="0">
+                <a:solidFill>
+                  <a:srgbClr val="FFFFFF"/>
+                </a:solidFill>
+                <a:latin typeface="Lato"/>
+                <a:ea typeface="Lato"/>
+                <a:cs typeface="Lato"/>
+                <a:sym typeface="Lato"/>
+              </a:rPr>
+              <a:t>/leaflet@1.3.3/</a:t>
+            </a:r>
+            <a:r>
+              <a:rPr lang="en" sz="1700" dirty="0" err="1">
+                <a:solidFill>
+                  <a:srgbClr val="FFFFFF"/>
+                </a:solidFill>
+                <a:latin typeface="Lato"/>
+                <a:ea typeface="Lato"/>
+                <a:cs typeface="Lato"/>
+                <a:sym typeface="Lato"/>
+              </a:rPr>
+              <a:t>dist</a:t>
+            </a:r>
+            <a:r>
+              <a:rPr lang="en" sz="1700" dirty="0">
+                <a:solidFill>
+                  <a:srgbClr val="FFFFFF"/>
+                </a:solidFill>
+                <a:latin typeface="Lato"/>
+                <a:ea typeface="Lato"/>
+                <a:cs typeface="Lato"/>
+                <a:sym typeface="Lato"/>
+              </a:rPr>
+              <a:t>/</a:t>
+            </a:r>
+            <a:r>
+              <a:rPr lang="en" sz="1700" dirty="0" err="1">
+                <a:solidFill>
+                  <a:srgbClr val="FFFFFF"/>
+                </a:solidFill>
+                <a:latin typeface="Lato"/>
+                <a:ea typeface="Lato"/>
+                <a:cs typeface="Lato"/>
+                <a:sym typeface="Lato"/>
+              </a:rPr>
+              <a:t>leaflet.css</a:t>
+            </a:r>
+            <a:endParaRPr sz="1700" dirty="0">
+              <a:solidFill>
+                <a:srgbClr val="FFFFFF"/>
+              </a:solidFill>
+              <a:latin typeface="Lato"/>
+              <a:ea typeface="Lato"/>
+              <a:cs typeface="Lato"/>
+              <a:sym typeface="Lato"/>
+            </a:endParaRPr>
+          </a:p>
+          <a:p>
+            <a:pPr marL="0" lvl="0" indent="0" algn="l" rtl="0">
+              <a:spcBef>
+                <a:spcPts val="0"/>
+              </a:spcBef>
+              <a:spcAft>
+                <a:spcPts val="0"/>
+              </a:spcAft>
+              <a:buNone/>
+            </a:pPr>
+            <a:r>
+              <a:rPr lang="en" sz="1700" dirty="0">
+                <a:solidFill>
+                  <a:srgbClr val="FFFFFF"/>
+                </a:solidFill>
+                <a:latin typeface="Lato"/>
+                <a:ea typeface="Lato"/>
+                <a:cs typeface="Lato"/>
+                <a:sym typeface="Lato"/>
+              </a:rPr>
+              <a:t>Leaflet </a:t>
+            </a:r>
+            <a:r>
+              <a:rPr lang="en" sz="1700" dirty="0" err="1">
+                <a:solidFill>
+                  <a:srgbClr val="FFFFFF"/>
+                </a:solidFill>
+                <a:latin typeface="Lato"/>
+                <a:ea typeface="Lato"/>
+                <a:cs typeface="Lato"/>
+                <a:sym typeface="Lato"/>
+              </a:rPr>
+              <a:t>Javascript</a:t>
+            </a:r>
+            <a:r>
+              <a:rPr lang="en" sz="1700" dirty="0">
+                <a:solidFill>
+                  <a:srgbClr val="FFFFFF"/>
+                </a:solidFill>
+                <a:latin typeface="Lato"/>
+                <a:ea typeface="Lato"/>
+                <a:cs typeface="Lato"/>
+                <a:sym typeface="Lato"/>
+              </a:rPr>
+              <a:t>: </a:t>
+            </a:r>
+            <a:r>
+              <a:rPr lang="en" sz="1700" dirty="0">
+                <a:solidFill>
+                  <a:schemeClr val="bg1"/>
+                </a:solidFill>
+                <a:uFill>
+                  <a:noFill/>
+                </a:uFill>
+                <a:latin typeface="Lato"/>
+                <a:ea typeface="Lato"/>
+                <a:cs typeface="Lato"/>
+                <a:sym typeface="Lato"/>
+                <a:hlinkClick r:id="rId5">
+                  <a:extLst>
+                    <a:ext uri="{A12FA001-AC4F-418D-AE19-62706E023703}">
+                      <ahyp:hlinkClr xmlns:ahyp="http://schemas.microsoft.com/office/drawing/2018/hyperlinkcolor" val="tx"/>
+                    </a:ext>
+                  </a:extLst>
+                </a:hlinkClick>
+              </a:rPr>
+              <a:t>https://unpkg.com/leaflet@1.3.3/dist/leaflet.js</a:t>
+            </a:r>
+            <a:br>
+              <a:rPr lang="en" sz="1700" dirty="0">
+                <a:solidFill>
+                  <a:srgbClr val="FFFFFF"/>
+                </a:solidFill>
+                <a:latin typeface="Lato"/>
+                <a:ea typeface="Lato"/>
+                <a:cs typeface="Lato"/>
+                <a:sym typeface="Lato"/>
+              </a:rPr>
+            </a:br>
+            <a:r>
+              <a:rPr lang="en" sz="1700" dirty="0">
+                <a:solidFill>
+                  <a:srgbClr val="FFFFFF"/>
+                </a:solidFill>
+                <a:latin typeface="Lato"/>
+                <a:ea typeface="Lato"/>
+                <a:cs typeface="Lato"/>
+                <a:sym typeface="Lato"/>
+              </a:rPr>
+              <a:t>Placeholder for </a:t>
+            </a:r>
+            <a:r>
+              <a:rPr lang="en" sz="1700" dirty="0" err="1">
+                <a:solidFill>
+                  <a:srgbClr val="FFFFFF"/>
+                </a:solidFill>
+                <a:latin typeface="Lato"/>
+                <a:ea typeface="Lato"/>
+                <a:cs typeface="Lato"/>
+                <a:sym typeface="Lato"/>
+              </a:rPr>
+              <a:t>MapID</a:t>
+            </a:r>
+            <a:endParaRPr sz="1700" dirty="0">
+              <a:solidFill>
+                <a:srgbClr val="FFFFFF"/>
+              </a:solidFill>
+              <a:latin typeface="Lato"/>
+              <a:ea typeface="Lato"/>
+              <a:cs typeface="Lato"/>
+              <a:sym typeface="Lato"/>
+            </a:endParaRPr>
+          </a:p>
+        </p:txBody>
+      </p:sp>
+    </p:spTree>
+  </p:cSld>
+  <p:clrMapOvr>
+    <a:masterClrMapping/>
+  </p:clrMapOvr>
+</p:sld>
+</file>
+
+<file path=ppt/slides/slide11.xml><?xml version="1.0" encoding="utf-8"?>
+<p:sld xmlns:a="http://schemas.openxmlformats.org/drawingml/2006/main" xmlns:r="http://schemas.openxmlformats.org/officeDocument/2006/relationships" xmlns:p="http://schemas.openxmlformats.org/presentationml/2006/main">
+  <p:cSld>
+    <p:spTree>
+      <p:nvGrpSpPr>
         <p:cNvPr id="1" name="Shape 125"/>
         <p:cNvGrpSpPr/>
         <p:nvPr/>
@@ -9145,7 +9787,7 @@
 </p:sld>
 </file>
 
-<file path=ppt/slides/slide11.xml><?xml version="1.0" encoding="utf-8"?>
+<file path=ppt/slides/slide12.xml><?xml version="1.0" encoding="utf-8"?>
 <p:sld xmlns:a="http://schemas.openxmlformats.org/drawingml/2006/main" xmlns:r="http://schemas.openxmlformats.org/officeDocument/2006/relationships" xmlns:p="http://schemas.openxmlformats.org/presentationml/2006/main">
   <p:cSld>
     <p:spTree>
@@ -9197,14 +9839,14 @@
               <a:buNone/>
             </a:pPr>
             <a:r>
-              <a:rPr lang="en" sz="3600">
+              <a:rPr lang="en" sz="3600" dirty="0">
                 <a:solidFill>
                   <a:srgbClr val="FFFFFF"/>
                 </a:solidFill>
               </a:rPr>
-              <a:t>Javascript</a:t>
+              <a:t>JavaScript</a:t>
             </a:r>
-            <a:endParaRPr sz="3600">
+            <a:endParaRPr sz="3600" dirty="0">
               <a:solidFill>
                 <a:srgbClr val="FFFFFF"/>
               </a:solidFill>
@@ -9289,7 +9931,7 @@
 </p:sld>
 </file>
 
-<file path=ppt/slides/slide12.xml><?xml version="1.0" encoding="utf-8"?>
+<file path=ppt/slides/slide13.xml><?xml version="1.0" encoding="utf-8"?>
 <p:sld xmlns:a="http://schemas.openxmlformats.org/drawingml/2006/main" xmlns:r="http://schemas.openxmlformats.org/officeDocument/2006/relationships" xmlns:p="http://schemas.openxmlformats.org/presentationml/2006/main">
   <p:cSld>
     <p:spTree>
@@ -9341,14 +9983,14 @@
               <a:buNone/>
             </a:pPr>
             <a:r>
-              <a:rPr lang="en" sz="3600">
+              <a:rPr lang="en" sz="3600" dirty="0">
                 <a:solidFill>
                   <a:srgbClr val="FFFFFF"/>
                 </a:solidFill>
               </a:rPr>
-              <a:t>Javascript 2</a:t>
+              <a:t>JavaScript 2</a:t>
             </a:r>
-            <a:endParaRPr sz="3600">
+            <a:endParaRPr sz="3600" dirty="0">
               <a:solidFill>
                 <a:srgbClr val="FFFFFF"/>
               </a:solidFill>
@@ -9433,7 +10075,7 @@
 </p:sld>
 </file>
 
-<file path=ppt/slides/slide13.xml><?xml version="1.0" encoding="utf-8"?>
+<file path=ppt/slides/slide14.xml><?xml version="1.0" encoding="utf-8"?>
 <p:sld xmlns:a="http://schemas.openxmlformats.org/drawingml/2006/main" xmlns:r="http://schemas.openxmlformats.org/officeDocument/2006/relationships" xmlns:p="http://schemas.openxmlformats.org/presentationml/2006/main">
   <p:cSld>
     <p:spTree>
@@ -9490,7 +10132,7 @@
                   <a:srgbClr val="FFFFFF"/>
                 </a:solidFill>
               </a:rPr>
-              <a:t>Javascript 3</a:t>
+              <a:t>JavaScript 3</a:t>
             </a:r>
             <a:endParaRPr sz="3600" dirty="0">
               <a:solidFill>
@@ -9577,7 +10219,7 @@
 </p:sld>
 </file>
 
-<file path=ppt/slides/slide14.xml><?xml version="1.0" encoding="utf-8"?>
+<file path=ppt/slides/slide15.xml><?xml version="1.0" encoding="utf-8"?>
 <p:sld xmlns:a="http://schemas.openxmlformats.org/drawingml/2006/main" xmlns:r="http://schemas.openxmlformats.org/officeDocument/2006/relationships" xmlns:p="http://schemas.openxmlformats.org/presentationml/2006/main">
   <p:cSld>
     <p:spTree>
@@ -9721,7 +10363,7 @@
 </p:sld>
 </file>
 
-<file path=ppt/slides/slide15.xml><?xml version="1.0" encoding="utf-8"?>
+<file path=ppt/slides/slide16.xml><?xml version="1.0" encoding="utf-8"?>
 <p:sld xmlns:a="http://schemas.openxmlformats.org/drawingml/2006/main" xmlns:r="http://schemas.openxmlformats.org/officeDocument/2006/relationships" xmlns:p="http://schemas.openxmlformats.org/presentationml/2006/main">
   <p:cSld>
     <p:spTree>
@@ -9857,109 +10499,6 @@
           </a:p>
         </p:txBody>
       </p:sp>
-    </p:spTree>
-  </p:cSld>
-  <p:clrMapOvr>
-    <a:masterClrMapping/>
-  </p:clrMapOvr>
-</p:sld>
-</file>
-
-<file path=ppt/slides/slide16.xml><?xml version="1.0" encoding="utf-8"?>
-<p:sld xmlns:a="http://schemas.openxmlformats.org/drawingml/2006/main" xmlns:r="http://schemas.openxmlformats.org/officeDocument/2006/relationships" xmlns:p="http://schemas.openxmlformats.org/presentationml/2006/main">
-  <p:cSld>
-    <p:spTree>
-      <p:nvGrpSpPr>
-        <p:cNvPr id="1" name="Shape 167"/>
-        <p:cNvGrpSpPr/>
-        <p:nvPr/>
-      </p:nvGrpSpPr>
-      <p:grpSpPr>
-        <a:xfrm>
-          <a:off x="0" y="0"/>
-          <a:ext cx="0" cy="0"/>
-          <a:chOff x="0" y="0"/>
-          <a:chExt cx="0" cy="0"/>
-        </a:xfrm>
-      </p:grpSpPr>
-      <p:sp>
-        <p:nvSpPr>
-          <p:cNvPr id="168" name="Google Shape;168;p29"/>
-          <p:cNvSpPr txBox="1">
-            <a:spLocks noGrp="1"/>
-          </p:cNvSpPr>
-          <p:nvPr>
-            <p:ph type="title"/>
-          </p:nvPr>
-        </p:nvSpPr>
-        <p:spPr>
-          <a:xfrm>
-            <a:off x="303300" y="193225"/>
-            <a:ext cx="8520600" cy="639600"/>
-          </a:xfrm>
-          <a:prstGeom prst="rect">
-            <a:avLst/>
-          </a:prstGeom>
-        </p:spPr>
-        <p:txBody>
-          <a:bodyPr spcFirstLastPara="1" wrap="square" lIns="91425" tIns="91425" rIns="91425" bIns="91425" anchor="t" anchorCtr="0">
-            <a:noAutofit/>
-          </a:bodyPr>
-          <a:lstStyle/>
-          <a:p>
-            <a:pPr marL="0" lvl="0" indent="0" algn="l" rtl="0">
-              <a:spcBef>
-                <a:spcPts val="0"/>
-              </a:spcBef>
-              <a:spcAft>
-                <a:spcPts val="0"/>
-              </a:spcAft>
-              <a:buNone/>
-            </a:pPr>
-            <a:r>
-              <a:rPr lang="en" sz="3600" dirty="0">
-                <a:solidFill>
-                  <a:srgbClr val="FFFFFF"/>
-                </a:solidFill>
-              </a:rPr>
-              <a:t>Libraries (Python)</a:t>
-            </a:r>
-            <a:endParaRPr sz="3600" dirty="0">
-              <a:solidFill>
-                <a:srgbClr val="FFFFFF"/>
-              </a:solidFill>
-            </a:endParaRPr>
-          </a:p>
-        </p:txBody>
-      </p:sp>
-      <p:pic>
-        <p:nvPicPr>
-          <p:cNvPr id="169" name="Google Shape;169;p29"/>
-          <p:cNvPicPr preferRelativeResize="0"/>
-          <p:nvPr/>
-        </p:nvPicPr>
-        <p:blipFill>
-          <a:blip r:embed="rId3">
-            <a:alphaModFix/>
-          </a:blip>
-          <a:stretch>
-            <a:fillRect/>
-          </a:stretch>
-        </p:blipFill>
-        <p:spPr>
-          <a:xfrm>
-            <a:off x="2125588" y="917750"/>
-            <a:ext cx="4892826" cy="4128700"/>
-          </a:xfrm>
-          <a:prstGeom prst="rect">
-            <a:avLst/>
-          </a:prstGeom>
-          <a:noFill/>
-          <a:ln>
-            <a:noFill/>
-          </a:ln>
-        </p:spPr>
-      </p:pic>
     </p:spTree>
   </p:cSld>
   <p:clrMapOvr>
@@ -10025,7 +10564,110 @@
                   <a:srgbClr val="FFFFFF"/>
                 </a:solidFill>
               </a:rPr>
-              <a:t>Libraries (Javascript)</a:t>
+              <a:t>Libraries (Python)</a:t>
+            </a:r>
+            <a:endParaRPr sz="3600" dirty="0">
+              <a:solidFill>
+                <a:srgbClr val="FFFFFF"/>
+              </a:solidFill>
+            </a:endParaRPr>
+          </a:p>
+        </p:txBody>
+      </p:sp>
+      <p:pic>
+        <p:nvPicPr>
+          <p:cNvPr id="169" name="Google Shape;169;p29"/>
+          <p:cNvPicPr preferRelativeResize="0"/>
+          <p:nvPr/>
+        </p:nvPicPr>
+        <p:blipFill>
+          <a:blip r:embed="rId3">
+            <a:alphaModFix/>
+          </a:blip>
+          <a:stretch>
+            <a:fillRect/>
+          </a:stretch>
+        </p:blipFill>
+        <p:spPr>
+          <a:xfrm>
+            <a:off x="2125588" y="917750"/>
+            <a:ext cx="4892826" cy="4128700"/>
+          </a:xfrm>
+          <a:prstGeom prst="rect">
+            <a:avLst/>
+          </a:prstGeom>
+          <a:noFill/>
+          <a:ln>
+            <a:noFill/>
+          </a:ln>
+        </p:spPr>
+      </p:pic>
+    </p:spTree>
+  </p:cSld>
+  <p:clrMapOvr>
+    <a:masterClrMapping/>
+  </p:clrMapOvr>
+</p:sld>
+</file>
+
+<file path=ppt/slides/slide18.xml><?xml version="1.0" encoding="utf-8"?>
+<p:sld xmlns:a="http://schemas.openxmlformats.org/drawingml/2006/main" xmlns:r="http://schemas.openxmlformats.org/officeDocument/2006/relationships" xmlns:p="http://schemas.openxmlformats.org/presentationml/2006/main">
+  <p:cSld>
+    <p:spTree>
+      <p:nvGrpSpPr>
+        <p:cNvPr id="1" name="Shape 167"/>
+        <p:cNvGrpSpPr/>
+        <p:nvPr/>
+      </p:nvGrpSpPr>
+      <p:grpSpPr>
+        <a:xfrm>
+          <a:off x="0" y="0"/>
+          <a:ext cx="0" cy="0"/>
+          <a:chOff x="0" y="0"/>
+          <a:chExt cx="0" cy="0"/>
+        </a:xfrm>
+      </p:grpSpPr>
+      <p:sp>
+        <p:nvSpPr>
+          <p:cNvPr id="168" name="Google Shape;168;p29"/>
+          <p:cNvSpPr txBox="1">
+            <a:spLocks noGrp="1"/>
+          </p:cNvSpPr>
+          <p:nvPr>
+            <p:ph type="title"/>
+          </p:nvPr>
+        </p:nvSpPr>
+        <p:spPr>
+          <a:xfrm>
+            <a:off x="303300" y="193225"/>
+            <a:ext cx="8520600" cy="639600"/>
+          </a:xfrm>
+          <a:prstGeom prst="rect">
+            <a:avLst/>
+          </a:prstGeom>
+        </p:spPr>
+        <p:txBody>
+          <a:bodyPr spcFirstLastPara="1" wrap="square" lIns="91425" tIns="91425" rIns="91425" bIns="91425" anchor="t" anchorCtr="0">
+            <a:noAutofit/>
+          </a:bodyPr>
+          <a:lstStyle/>
+          <a:p>
+            <a:pPr marL="0" lvl="0" indent="0" algn="l" rtl="0">
+              <a:spcBef>
+                <a:spcPts val="0"/>
+              </a:spcBef>
+              <a:spcAft>
+                <a:spcPts val="0"/>
+              </a:spcAft>
+              <a:buNone/>
+            </a:pPr>
+            <a:r>
+              <a:rPr lang="en" sz="3600" dirty="0">
+                <a:solidFill>
+                  <a:srgbClr val="FFFFFF"/>
+                </a:solidFill>
+              </a:rPr>
+              <a:t>Libraries (JavaScript)</a:t>
             </a:r>
             <a:endParaRPr sz="3600" dirty="0">
               <a:solidFill>
@@ -10078,7 +10720,7 @@
 </p:sld>
 </file>
 
-<file path=ppt/slides/slide18.xml><?xml version="1.0" encoding="utf-8"?>
+<file path=ppt/slides/slide19.xml><?xml version="1.0" encoding="utf-8"?>
 <p:sld xmlns:a="http://schemas.openxmlformats.org/drawingml/2006/main" xmlns:r="http://schemas.openxmlformats.org/officeDocument/2006/relationships" xmlns:p="http://schemas.openxmlformats.org/presentationml/2006/main">
   <p:cSld>
     <p:spTree>
@@ -10148,150 +10790,6 @@
       <p:sp>
         <p:nvSpPr>
           <p:cNvPr id="175" name="Google Shape;175;p30"/>
-          <p:cNvSpPr txBox="1"/>
-          <p:nvPr/>
-        </p:nvSpPr>
-        <p:spPr>
-          <a:xfrm>
-            <a:off x="303300" y="1819625"/>
-            <a:ext cx="8520600" cy="2899200"/>
-          </a:xfrm>
-          <a:prstGeom prst="rect">
-            <a:avLst/>
-          </a:prstGeom>
-          <a:noFill/>
-          <a:ln>
-            <a:noFill/>
-          </a:ln>
-        </p:spPr>
-        <p:txBody>
-          <a:bodyPr spcFirstLastPara="1" wrap="square" lIns="91425" tIns="91425" rIns="91425" bIns="91425" anchor="t" anchorCtr="0">
-            <a:noAutofit/>
-          </a:bodyPr>
-          <a:lstStyle/>
-          <a:p>
-            <a:pPr marL="0" lvl="0" indent="0" algn="l" rtl="0">
-              <a:spcBef>
-                <a:spcPts val="0"/>
-              </a:spcBef>
-              <a:spcAft>
-                <a:spcPts val="0"/>
-              </a:spcAft>
-              <a:buNone/>
-            </a:pPr>
-            <a:br>
-              <a:rPr lang="en" sz="1700">
-                <a:solidFill>
-                  <a:srgbClr val="FFFFFF"/>
-                </a:solidFill>
-                <a:latin typeface="Lato"/>
-                <a:ea typeface="Lato"/>
-                <a:cs typeface="Lato"/>
-                <a:sym typeface="Lato"/>
-              </a:rPr>
-            </a:br>
-            <a:r>
-              <a:rPr lang="en" sz="1700">
-                <a:solidFill>
-                  <a:srgbClr val="FFFFFF"/>
-                </a:solidFill>
-                <a:latin typeface="Lato"/>
-                <a:ea typeface="Lato"/>
-                <a:cs typeface="Lato"/>
-                <a:sym typeface="Lato"/>
-              </a:rPr>
-              <a:t>Blah blah</a:t>
-            </a:r>
-            <a:endParaRPr sz="1700">
-              <a:solidFill>
-                <a:srgbClr val="FFFFFF"/>
-              </a:solidFill>
-              <a:latin typeface="Lato"/>
-              <a:ea typeface="Lato"/>
-              <a:cs typeface="Lato"/>
-              <a:sym typeface="Lato"/>
-            </a:endParaRPr>
-          </a:p>
-        </p:txBody>
-      </p:sp>
-    </p:spTree>
-  </p:cSld>
-  <p:clrMapOvr>
-    <a:masterClrMapping/>
-  </p:clrMapOvr>
-</p:sld>
-</file>
-
-<file path=ppt/slides/slide19.xml><?xml version="1.0" encoding="utf-8"?>
-<p:sld xmlns:a="http://schemas.openxmlformats.org/drawingml/2006/main" xmlns:r="http://schemas.openxmlformats.org/officeDocument/2006/relationships" xmlns:p="http://schemas.openxmlformats.org/presentationml/2006/main">
-  <p:cSld>
-    <p:spTree>
-      <p:nvGrpSpPr>
-        <p:cNvPr id="1" name="Shape 179"/>
-        <p:cNvGrpSpPr/>
-        <p:nvPr/>
-      </p:nvGrpSpPr>
-      <p:grpSpPr>
-        <a:xfrm>
-          <a:off x="0" y="0"/>
-          <a:ext cx="0" cy="0"/>
-          <a:chOff x="0" y="0"/>
-          <a:chExt cx="0" cy="0"/>
-        </a:xfrm>
-      </p:grpSpPr>
-      <p:sp>
-        <p:nvSpPr>
-          <p:cNvPr id="180" name="Google Shape;180;p31"/>
-          <p:cNvSpPr txBox="1">
-            <a:spLocks noGrp="1"/>
-          </p:cNvSpPr>
-          <p:nvPr>
-            <p:ph type="title"/>
-          </p:nvPr>
-        </p:nvSpPr>
-        <p:spPr>
-          <a:xfrm>
-            <a:off x="303300" y="193225"/>
-            <a:ext cx="8520600" cy="639600"/>
-          </a:xfrm>
-          <a:prstGeom prst="rect">
-            <a:avLst/>
-          </a:prstGeom>
-        </p:spPr>
-        <p:txBody>
-          <a:bodyPr spcFirstLastPara="1" wrap="square" lIns="91425" tIns="91425" rIns="91425" bIns="91425" anchor="t" anchorCtr="0">
-            <a:noAutofit/>
-          </a:bodyPr>
-          <a:lstStyle/>
-          <a:p>
-            <a:pPr marL="0" lvl="0" indent="0" algn="l" rtl="0">
-              <a:spcBef>
-                <a:spcPts val="0"/>
-              </a:spcBef>
-              <a:spcAft>
-                <a:spcPts val="0"/>
-              </a:spcAft>
-              <a:buNone/>
-            </a:pPr>
-            <a:r>
-              <a:rPr lang="en" sz="3600">
-                <a:solidFill>
-                  <a:srgbClr val="FFFFFF"/>
-                </a:solidFill>
-              </a:rPr>
-              <a:t>Post-Mortem</a:t>
-            </a:r>
-            <a:endParaRPr sz="3600">
-              <a:solidFill>
-                <a:srgbClr val="FFFFFF"/>
-              </a:solidFill>
-            </a:endParaRPr>
-          </a:p>
-        </p:txBody>
-      </p:sp>
-      <p:sp>
-        <p:nvSpPr>
-          <p:cNvPr id="181" name="Google Shape;181;p31"/>
           <p:cNvSpPr txBox="1"/>
           <p:nvPr/>
         </p:nvSpPr>
@@ -10587,6 +11085,150 @@
 </p:sld>
 </file>
 
+<file path=ppt/slides/slide20.xml><?xml version="1.0" encoding="utf-8"?>
+<p:sld xmlns:a="http://schemas.openxmlformats.org/drawingml/2006/main" xmlns:r="http://schemas.openxmlformats.org/officeDocument/2006/relationships" xmlns:p="http://schemas.openxmlformats.org/presentationml/2006/main">
+  <p:cSld>
+    <p:spTree>
+      <p:nvGrpSpPr>
+        <p:cNvPr id="1" name="Shape 179"/>
+        <p:cNvGrpSpPr/>
+        <p:nvPr/>
+      </p:nvGrpSpPr>
+      <p:grpSpPr>
+        <a:xfrm>
+          <a:off x="0" y="0"/>
+          <a:ext cx="0" cy="0"/>
+          <a:chOff x="0" y="0"/>
+          <a:chExt cx="0" cy="0"/>
+        </a:xfrm>
+      </p:grpSpPr>
+      <p:sp>
+        <p:nvSpPr>
+          <p:cNvPr id="180" name="Google Shape;180;p31"/>
+          <p:cNvSpPr txBox="1">
+            <a:spLocks noGrp="1"/>
+          </p:cNvSpPr>
+          <p:nvPr>
+            <p:ph type="title"/>
+          </p:nvPr>
+        </p:nvSpPr>
+        <p:spPr>
+          <a:xfrm>
+            <a:off x="303300" y="193225"/>
+            <a:ext cx="8520600" cy="639600"/>
+          </a:xfrm>
+          <a:prstGeom prst="rect">
+            <a:avLst/>
+          </a:prstGeom>
+        </p:spPr>
+        <p:txBody>
+          <a:bodyPr spcFirstLastPara="1" wrap="square" lIns="91425" tIns="91425" rIns="91425" bIns="91425" anchor="t" anchorCtr="0">
+            <a:noAutofit/>
+          </a:bodyPr>
+          <a:lstStyle/>
+          <a:p>
+            <a:pPr marL="0" lvl="0" indent="0" algn="l" rtl="0">
+              <a:spcBef>
+                <a:spcPts val="0"/>
+              </a:spcBef>
+              <a:spcAft>
+                <a:spcPts val="0"/>
+              </a:spcAft>
+              <a:buNone/>
+            </a:pPr>
+            <a:r>
+              <a:rPr lang="en" sz="3600">
+                <a:solidFill>
+                  <a:srgbClr val="FFFFFF"/>
+                </a:solidFill>
+              </a:rPr>
+              <a:t>Post-Mortem</a:t>
+            </a:r>
+            <a:endParaRPr sz="3600">
+              <a:solidFill>
+                <a:srgbClr val="FFFFFF"/>
+              </a:solidFill>
+            </a:endParaRPr>
+          </a:p>
+        </p:txBody>
+      </p:sp>
+      <p:sp>
+        <p:nvSpPr>
+          <p:cNvPr id="181" name="Google Shape;181;p31"/>
+          <p:cNvSpPr txBox="1"/>
+          <p:nvPr/>
+        </p:nvSpPr>
+        <p:spPr>
+          <a:xfrm>
+            <a:off x="303300" y="1819625"/>
+            <a:ext cx="8520600" cy="2899200"/>
+          </a:xfrm>
+          <a:prstGeom prst="rect">
+            <a:avLst/>
+          </a:prstGeom>
+          <a:noFill/>
+          <a:ln>
+            <a:noFill/>
+          </a:ln>
+        </p:spPr>
+        <p:txBody>
+          <a:bodyPr spcFirstLastPara="1" wrap="square" lIns="91425" tIns="91425" rIns="91425" bIns="91425" anchor="t" anchorCtr="0">
+            <a:noAutofit/>
+          </a:bodyPr>
+          <a:lstStyle/>
+          <a:p>
+            <a:pPr marL="0" lvl="0" indent="0" algn="l" rtl="0">
+              <a:spcBef>
+                <a:spcPts val="0"/>
+              </a:spcBef>
+              <a:spcAft>
+                <a:spcPts val="0"/>
+              </a:spcAft>
+              <a:buNone/>
+            </a:pPr>
+            <a:br>
+              <a:rPr lang="en" sz="1700">
+                <a:solidFill>
+                  <a:srgbClr val="FFFFFF"/>
+                </a:solidFill>
+                <a:latin typeface="Lato"/>
+                <a:ea typeface="Lato"/>
+                <a:cs typeface="Lato"/>
+                <a:sym typeface="Lato"/>
+              </a:rPr>
+            </a:br>
+            <a:r>
+              <a:rPr lang="en" sz="1700">
+                <a:solidFill>
+                  <a:srgbClr val="FFFFFF"/>
+                </a:solidFill>
+                <a:latin typeface="Lato"/>
+                <a:ea typeface="Lato"/>
+                <a:cs typeface="Lato"/>
+                <a:sym typeface="Lato"/>
+              </a:rPr>
+              <a:t>Blah blah</a:t>
+            </a:r>
+            <a:endParaRPr sz="1700">
+              <a:solidFill>
+                <a:srgbClr val="FFFFFF"/>
+              </a:solidFill>
+              <a:latin typeface="Lato"/>
+              <a:ea typeface="Lato"/>
+              <a:cs typeface="Lato"/>
+              <a:sym typeface="Lato"/>
+            </a:endParaRPr>
+          </a:p>
+        </p:txBody>
+      </p:sp>
+    </p:spTree>
+  </p:cSld>
+  <p:clrMapOvr>
+    <a:masterClrMapping/>
+  </p:clrMapOvr>
+</p:sld>
+</file>
+
 <file path=ppt/slides/slide3.xml><?xml version="1.0" encoding="utf-8"?>
 <p:sld xmlns:a="http://schemas.openxmlformats.org/drawingml/2006/main" xmlns:r="http://schemas.openxmlformats.org/officeDocument/2006/relationships" xmlns:p="http://schemas.openxmlformats.org/presentationml/2006/main">
   <p:cSld>
@@ -12151,7 +12793,7 @@
   <p:cSld>
     <p:spTree>
       <p:nvGrpSpPr>
-        <p:cNvPr id="1" name="Shape 119"/>
+        <p:cNvPr id="1" name="Shape 113"/>
         <p:cNvGrpSpPr/>
         <p:nvPr/>
       </p:nvGrpSpPr>
@@ -12165,7 +12807,7 @@
       </p:grpSpPr>
       <p:sp>
         <p:nvSpPr>
-          <p:cNvPr id="120" name="Google Shape;120;p21"/>
+          <p:cNvPr id="114" name="Google Shape;114;p20"/>
           <p:cNvSpPr txBox="1">
             <a:spLocks noGrp="1"/>
           </p:cNvSpPr>
@@ -12198,14 +12840,14 @@
               <a:buNone/>
             </a:pPr>
             <a:r>
-              <a:rPr lang="en" sz="3600">
+              <a:rPr lang="en" sz="3600" dirty="0">
                 <a:solidFill>
                   <a:srgbClr val="FFFFFF"/>
                 </a:solidFill>
               </a:rPr>
-              <a:t>What is in the HTML?</a:t>
+              <a:t>Data Munging</a:t>
             </a:r>
-            <a:endParaRPr sz="3600">
+            <a:endParaRPr sz="3600" dirty="0">
               <a:solidFill>
                 <a:srgbClr val="FFFFFF"/>
               </a:solidFill>
@@ -12215,7 +12857,7 @@
       </p:sp>
       <p:sp>
         <p:nvSpPr>
-          <p:cNvPr id="121" name="Google Shape;121;p21"/>
+          <p:cNvPr id="115" name="Google Shape;115;p20"/>
           <p:cNvSpPr txBox="1"/>
           <p:nvPr/>
         </p:nvSpPr>
@@ -12238,17 +12880,9 @@
           </a:bodyPr>
           <a:lstStyle/>
           <a:p>
-            <a:pPr marL="0" lvl="0" indent="0" algn="l" rtl="0">
-              <a:spcBef>
-                <a:spcPts val="0"/>
-              </a:spcBef>
-              <a:spcAft>
-                <a:spcPts val="0"/>
-              </a:spcAft>
-              <a:buNone/>
-            </a:pPr>
-            <a:br>
-              <a:rPr lang="en" sz="1700" dirty="0">
+            <a:pPr lvl="0"/>
+            <a:r>
+              <a:rPr lang="en-US" sz="1700" dirty="0">
                 <a:solidFill>
                   <a:srgbClr val="FFFFFF"/>
                 </a:solidFill>
@@ -12257,9 +12891,10 @@
                 <a:cs typeface="Lato"/>
                 <a:sym typeface="Lato"/>
               </a:rPr>
-            </a:br>
+              <a:t>Once we had the data from </a:t>
+            </a:r>
             <a:r>
-              <a:rPr lang="en" sz="1700" dirty="0" err="1">
+              <a:rPr lang="en-US" sz="1700" dirty="0" err="1">
                 <a:solidFill>
                   <a:srgbClr val="FFFFFF"/>
                 </a:solidFill>
@@ -12268,10 +12903,10 @@
                 <a:cs typeface="Lato"/>
                 <a:sym typeface="Lato"/>
               </a:rPr>
-              <a:t>BootStrap</a:t>
+              <a:t>Numbeo</a:t>
             </a:r>
             <a:r>
-              <a:rPr lang="en" sz="1700" dirty="0">
+              <a:rPr lang="en-US" sz="1700" dirty="0">
                 <a:solidFill>
                   <a:srgbClr val="FFFFFF"/>
                 </a:solidFill>
@@ -12280,331 +12915,9 @@
                 <a:cs typeface="Lato"/>
                 <a:sym typeface="Lato"/>
               </a:rPr>
-              <a:t>: </a:t>
+              <a:t> we had to insert it into an SQL Database. We removed the data that we didn’t need and merged it into one table. From there we transformed it into SQLite so that it could be more easily read by JavaScript.</a:t>
             </a:r>
-            <a:r>
-              <a:rPr lang="en" sz="1700" dirty="0">
-                <a:solidFill>
-                  <a:schemeClr val="bg1"/>
-                </a:solidFill>
-                <a:uFill>
-                  <a:noFill/>
-                </a:uFill>
-                <a:latin typeface="Lato"/>
-                <a:ea typeface="Lato"/>
-                <a:cs typeface="Lato"/>
-                <a:sym typeface="Lato"/>
-                <a:hlinkClick r:id="rId3">
-                  <a:extLst>
-                    <a:ext uri="{A12FA001-AC4F-418D-AE19-62706E023703}">
-                      <ahyp:hlinkClr xmlns:ahyp="http://schemas.microsoft.com/office/drawing/2018/hyperlinkcolor" val="tx"/>
-                    </a:ext>
-                  </a:extLst>
-                </a:hlinkClick>
-              </a:rPr>
-              <a:t>https://maxcdn.bootstrapcdn.com/bootstrap/3.3.7/css/bootstrap.min.css</a:t>
-            </a:r>
-            <a:br>
-              <a:rPr lang="en" sz="1700" dirty="0">
-                <a:solidFill>
-                  <a:srgbClr val="FFFFFF"/>
-                </a:solidFill>
-                <a:latin typeface="Lato"/>
-                <a:ea typeface="Lato"/>
-                <a:cs typeface="Lato"/>
-                <a:sym typeface="Lato"/>
-              </a:rPr>
-            </a:br>
-            <a:r>
-              <a:rPr lang="en" sz="1700" dirty="0">
-                <a:solidFill>
-                  <a:srgbClr val="FFFFFF"/>
-                </a:solidFill>
-                <a:latin typeface="Lato"/>
-                <a:ea typeface="Lato"/>
-                <a:cs typeface="Lato"/>
-                <a:sym typeface="Lato"/>
-              </a:rPr>
-              <a:t>D3: </a:t>
-            </a:r>
-            <a:r>
-              <a:rPr lang="en" sz="1700" dirty="0">
-                <a:solidFill>
-                  <a:schemeClr val="bg1"/>
-                </a:solidFill>
-                <a:uFill>
-                  <a:noFill/>
-                </a:uFill>
-                <a:latin typeface="Lato"/>
-                <a:ea typeface="Lato"/>
-                <a:cs typeface="Lato"/>
-                <a:sym typeface="Lato"/>
-                <a:hlinkClick r:id="rId4">
-                  <a:extLst>
-                    <a:ext uri="{A12FA001-AC4F-418D-AE19-62706E023703}">
-                      <ahyp:hlinkClr xmlns:ahyp="http://schemas.microsoft.com/office/drawing/2018/hyperlinkcolor" val="tx"/>
-                    </a:ext>
-                  </a:extLst>
-                </a:hlinkClick>
-              </a:rPr>
-              <a:t>https://cdnjs.cloudflare.com/ajax/libs/d3/5.5.0/d3.js</a:t>
-            </a:r>
-            <a:br>
-              <a:rPr lang="en" sz="1700" dirty="0">
-                <a:solidFill>
-                  <a:srgbClr val="FFFFFF"/>
-                </a:solidFill>
-                <a:latin typeface="Lato"/>
-                <a:ea typeface="Lato"/>
-                <a:cs typeface="Lato"/>
-                <a:sym typeface="Lato"/>
-              </a:rPr>
-            </a:br>
-            <a:r>
-              <a:rPr lang="en" sz="1700" dirty="0">
-                <a:solidFill>
-                  <a:srgbClr val="FFFFFF"/>
-                </a:solidFill>
-                <a:latin typeface="Lato"/>
-                <a:ea typeface="Lato"/>
-                <a:cs typeface="Lato"/>
-                <a:sym typeface="Lato"/>
-              </a:rPr>
-              <a:t>CSS: static/</a:t>
-            </a:r>
-            <a:r>
-              <a:rPr lang="en" sz="1700" dirty="0" err="1">
-                <a:solidFill>
-                  <a:srgbClr val="FFFFFF"/>
-                </a:solidFill>
-                <a:latin typeface="Lato"/>
-                <a:ea typeface="Lato"/>
-                <a:cs typeface="Lato"/>
-                <a:sym typeface="Lato"/>
-              </a:rPr>
-              <a:t>css</a:t>
-            </a:r>
-            <a:r>
-              <a:rPr lang="en" sz="1700" dirty="0">
-                <a:solidFill>
-                  <a:srgbClr val="FFFFFF"/>
-                </a:solidFill>
-                <a:latin typeface="Lato"/>
-                <a:ea typeface="Lato"/>
-                <a:cs typeface="Lato"/>
-                <a:sym typeface="Lato"/>
-              </a:rPr>
-              <a:t>/</a:t>
-            </a:r>
-            <a:r>
-              <a:rPr lang="en" sz="1700" dirty="0" err="1">
-                <a:solidFill>
-                  <a:srgbClr val="FFFFFF"/>
-                </a:solidFill>
-                <a:latin typeface="Lato"/>
-                <a:ea typeface="Lato"/>
-                <a:cs typeface="Lato"/>
-                <a:sym typeface="Lato"/>
-              </a:rPr>
-              <a:t>style.css</a:t>
-            </a:r>
-            <a:br>
-              <a:rPr lang="en" sz="1700" dirty="0">
-                <a:solidFill>
-                  <a:srgbClr val="FFFFFF"/>
-                </a:solidFill>
-                <a:latin typeface="Lato"/>
-                <a:ea typeface="Lato"/>
-                <a:cs typeface="Lato"/>
-                <a:sym typeface="Lato"/>
-              </a:rPr>
-            </a:br>
-            <a:r>
-              <a:rPr lang="en" sz="1700" dirty="0">
-                <a:solidFill>
-                  <a:srgbClr val="FFFFFF"/>
-                </a:solidFill>
-                <a:latin typeface="Lato"/>
-                <a:ea typeface="Lato"/>
-                <a:cs typeface="Lato"/>
-                <a:sym typeface="Lato"/>
-              </a:rPr>
-              <a:t>Leaflet CSS: https://</a:t>
-            </a:r>
-            <a:r>
-              <a:rPr lang="en" sz="1700" dirty="0" err="1">
-                <a:solidFill>
-                  <a:srgbClr val="FFFFFF"/>
-                </a:solidFill>
-                <a:latin typeface="Lato"/>
-                <a:ea typeface="Lato"/>
-                <a:cs typeface="Lato"/>
-                <a:sym typeface="Lato"/>
-              </a:rPr>
-              <a:t>unpkg.com</a:t>
-            </a:r>
-            <a:r>
-              <a:rPr lang="en" sz="1700" dirty="0">
-                <a:solidFill>
-                  <a:srgbClr val="FFFFFF"/>
-                </a:solidFill>
-                <a:latin typeface="Lato"/>
-                <a:ea typeface="Lato"/>
-                <a:cs typeface="Lato"/>
-                <a:sym typeface="Lato"/>
-              </a:rPr>
-              <a:t>/leaflet@1.3.3/</a:t>
-            </a:r>
-            <a:r>
-              <a:rPr lang="en" sz="1700" dirty="0" err="1">
-                <a:solidFill>
-                  <a:srgbClr val="FFFFFF"/>
-                </a:solidFill>
-                <a:latin typeface="Lato"/>
-                <a:ea typeface="Lato"/>
-                <a:cs typeface="Lato"/>
-                <a:sym typeface="Lato"/>
-              </a:rPr>
-              <a:t>dist</a:t>
-            </a:r>
-            <a:r>
-              <a:rPr lang="en" sz="1700" dirty="0">
-                <a:solidFill>
-                  <a:srgbClr val="FFFFFF"/>
-                </a:solidFill>
-                <a:latin typeface="Lato"/>
-                <a:ea typeface="Lato"/>
-                <a:cs typeface="Lato"/>
-                <a:sym typeface="Lato"/>
-              </a:rPr>
-              <a:t>/</a:t>
-            </a:r>
-            <a:r>
-              <a:rPr lang="en" sz="1700" dirty="0" err="1">
-                <a:solidFill>
-                  <a:srgbClr val="FFFFFF"/>
-                </a:solidFill>
-                <a:latin typeface="Lato"/>
-                <a:ea typeface="Lato"/>
-                <a:cs typeface="Lato"/>
-                <a:sym typeface="Lato"/>
-              </a:rPr>
-              <a:t>leaflet.css</a:t>
-            </a:r>
-            <a:endParaRPr sz="1700" dirty="0">
-              <a:solidFill>
-                <a:srgbClr val="FFFFFF"/>
-              </a:solidFill>
-              <a:latin typeface="Lato"/>
-              <a:ea typeface="Lato"/>
-              <a:cs typeface="Lato"/>
-              <a:sym typeface="Lato"/>
-            </a:endParaRPr>
-          </a:p>
-          <a:p>
-            <a:pPr marL="0" lvl="0" indent="0" algn="l" rtl="0">
-              <a:spcBef>
-                <a:spcPts val="0"/>
-              </a:spcBef>
-              <a:spcAft>
-                <a:spcPts val="0"/>
-              </a:spcAft>
-              <a:buNone/>
-            </a:pPr>
-            <a:r>
-              <a:rPr lang="en" sz="1700" dirty="0">
-                <a:solidFill>
-                  <a:srgbClr val="FFFFFF"/>
-                </a:solidFill>
-                <a:latin typeface="Lato"/>
-                <a:ea typeface="Lato"/>
-                <a:cs typeface="Lato"/>
-                <a:sym typeface="Lato"/>
-              </a:rPr>
-              <a:t>Leaflet </a:t>
-            </a:r>
-            <a:r>
-              <a:rPr lang="en" sz="1700" dirty="0" err="1">
-                <a:solidFill>
-                  <a:srgbClr val="FFFFFF"/>
-                </a:solidFill>
-                <a:latin typeface="Lato"/>
-                <a:ea typeface="Lato"/>
-                <a:cs typeface="Lato"/>
-                <a:sym typeface="Lato"/>
-              </a:rPr>
-              <a:t>Javascript</a:t>
-            </a:r>
-            <a:r>
-              <a:rPr lang="en" sz="1700" dirty="0">
-                <a:solidFill>
-                  <a:srgbClr val="FFFFFF"/>
-                </a:solidFill>
-                <a:latin typeface="Lato"/>
-                <a:ea typeface="Lato"/>
-                <a:cs typeface="Lato"/>
-                <a:sym typeface="Lato"/>
-              </a:rPr>
-              <a:t>: </a:t>
-            </a:r>
-            <a:r>
-              <a:rPr lang="en" sz="1700" dirty="0">
-                <a:solidFill>
-                  <a:schemeClr val="bg1"/>
-                </a:solidFill>
-                <a:uFill>
-                  <a:noFill/>
-                </a:uFill>
-                <a:latin typeface="Lato"/>
-                <a:ea typeface="Lato"/>
-                <a:cs typeface="Lato"/>
-                <a:sym typeface="Lato"/>
-                <a:hlinkClick r:id="rId5">
-                  <a:extLst>
-                    <a:ext uri="{A12FA001-AC4F-418D-AE19-62706E023703}">
-                      <ahyp:hlinkClr xmlns:ahyp="http://schemas.microsoft.com/office/drawing/2018/hyperlinkcolor" val="tx"/>
-                    </a:ext>
-                  </a:extLst>
-                </a:hlinkClick>
-              </a:rPr>
-              <a:t>https://unpkg.com/leaflet@1.3.3/dist/leaflet.js</a:t>
-            </a:r>
-            <a:br>
-              <a:rPr lang="en" sz="1700" dirty="0">
-                <a:solidFill>
-                  <a:srgbClr val="FFFFFF"/>
-                </a:solidFill>
-                <a:latin typeface="Lato"/>
-                <a:ea typeface="Lato"/>
-                <a:cs typeface="Lato"/>
-                <a:sym typeface="Lato"/>
-              </a:rPr>
-            </a:br>
-            <a:r>
-              <a:rPr lang="en" sz="1700" dirty="0">
-                <a:solidFill>
-                  <a:srgbClr val="FFFFFF"/>
-                </a:solidFill>
-                <a:latin typeface="Lato"/>
-                <a:ea typeface="Lato"/>
-                <a:cs typeface="Lato"/>
-                <a:sym typeface="Lato"/>
-              </a:rPr>
-              <a:t>Placeholder for </a:t>
-            </a:r>
-            <a:r>
-              <a:rPr lang="en" sz="1700" dirty="0" err="1">
-                <a:solidFill>
-                  <a:srgbClr val="FFFFFF"/>
-                </a:solidFill>
-                <a:latin typeface="Lato"/>
-                <a:ea typeface="Lato"/>
-                <a:cs typeface="Lato"/>
-                <a:sym typeface="Lato"/>
-              </a:rPr>
-              <a:t>MapID</a:t>
-            </a:r>
-            <a:endParaRPr sz="1700" dirty="0">
+            <a:endParaRPr lang="en" sz="1700" dirty="0">
               <a:solidFill>
                 <a:srgbClr val="FFFFFF"/>
               </a:solidFill>
@@ -12617,6 +12930,11 @@
         </p:txBody>
       </p:sp>
     </p:spTree>
+    <p:extLst>
+      <p:ext uri="{BB962C8B-B14F-4D97-AF65-F5344CB8AC3E}">
+        <p14:creationId xmlns:p14="http://schemas.microsoft.com/office/powerpoint/2010/main" val="1912523930"/>
+      </p:ext>
+    </p:extLst>
   </p:cSld>
   <p:clrMapOvr>
     <a:masterClrMapping/>

</xml_diff>

<commit_message>
Added summary of work to PPT
</commit_message>
<xml_diff>
--- a/Homies City Collection.pptx
+++ b/Homies City Collection.pptx
@@ -33,14 +33,14 @@
   <p:notesSz cx="6858000" cy="9144000"/>
   <p:embeddedFontLst>
     <p:embeddedFont>
-      <p:font typeface="Lato" panose="020F0502020204030203" pitchFamily="34" charset="77"/>
+      <p:font typeface="Lato" panose="020B0604020202020204" charset="0"/>
       <p:regular r:id="rId23"/>
       <p:bold r:id="rId24"/>
       <p:italic r:id="rId25"/>
       <p:boldItalic r:id="rId26"/>
     </p:embeddedFont>
     <p:embeddedFont>
-      <p:font typeface="Raleway" pitchFamily="2" charset="77"/>
+      <p:font typeface="Raleway" panose="020B0604020202020204" charset="0"/>
       <p:regular r:id="rId27"/>
       <p:bold r:id="rId28"/>
       <p:italic r:id="rId29"/>
@@ -307,8 +307,8 @@
 <pc:chgInfo xmlns:a="http://schemas.openxmlformats.org/drawingml/2006/main" xmlns:r="http://schemas.openxmlformats.org/officeDocument/2006/relationships" xmlns:ac="http://schemas.microsoft.com/office/drawing/2013/main/command" xmlns:pc="http://schemas.microsoft.com/office/powerpoint/2013/main/command">
   <pc:docChgLst>
     <pc:chgData name="Colin" userId="c2c872a862d4dd17" providerId="LiveId" clId="{DBF0D679-A1D2-41BA-9DE5-196B1668C167}"/>
-    <pc:docChg chg="undo custSel addSld delSld modSld">
-      <pc:chgData name="Colin" userId="c2c872a862d4dd17" providerId="LiveId" clId="{DBF0D679-A1D2-41BA-9DE5-196B1668C167}" dt="2020-07-20T01:29:27.871" v="1659" actId="20577"/>
+    <pc:docChg chg="undo custSel addSld delSld modSld sldOrd">
+      <pc:chgData name="Colin" userId="c2c872a862d4dd17" providerId="LiveId" clId="{DBF0D679-A1D2-41BA-9DE5-196B1668C167}" dt="2020-07-21T00:03:47.210" v="2929" actId="20577"/>
       <pc:docMkLst>
         <pc:docMk/>
       </pc:docMkLst>
@@ -388,8 +388,8 @@
           </ac:spMkLst>
         </pc:spChg>
       </pc:sldChg>
-      <pc:sldChg chg="modSp mod">
-        <pc:chgData name="Colin" userId="c2c872a862d4dd17" providerId="LiveId" clId="{DBF0D679-A1D2-41BA-9DE5-196B1668C167}" dt="2020-07-20T01:29:22.173" v="1657" actId="20577"/>
+      <pc:sldChg chg="modSp mod ord">
+        <pc:chgData name="Colin" userId="c2c872a862d4dd17" providerId="LiveId" clId="{DBF0D679-A1D2-41BA-9DE5-196B1668C167}" dt="2020-07-20T03:13:43.384" v="2788"/>
         <pc:sldMkLst>
           <pc:docMk/>
           <pc:sldMk cId="0" sldId="268"/>
@@ -437,6 +437,36 @@
             <pc:docMk/>
             <pc:sldMk cId="0" sldId="272"/>
             <ac:spMk id="168" creationId="{00000000-0000-0000-0000-000000000000}"/>
+          </ac:spMkLst>
+        </pc:spChg>
+      </pc:sldChg>
+      <pc:sldChg chg="modSp mod">
+        <pc:chgData name="Colin" userId="c2c872a862d4dd17" providerId="LiveId" clId="{DBF0D679-A1D2-41BA-9DE5-196B1668C167}" dt="2020-07-21T00:03:47.210" v="2929" actId="20577"/>
+        <pc:sldMkLst>
+          <pc:docMk/>
+          <pc:sldMk cId="0" sldId="273"/>
+        </pc:sldMkLst>
+        <pc:spChg chg="mod">
+          <ac:chgData name="Colin" userId="c2c872a862d4dd17" providerId="LiveId" clId="{DBF0D679-A1D2-41BA-9DE5-196B1668C167}" dt="2020-07-21T00:03:47.210" v="2929" actId="20577"/>
+          <ac:spMkLst>
+            <pc:docMk/>
+            <pc:sldMk cId="0" sldId="273"/>
+            <ac:spMk id="175" creationId="{00000000-0000-0000-0000-000000000000}"/>
+          </ac:spMkLst>
+        </pc:spChg>
+      </pc:sldChg>
+      <pc:sldChg chg="modSp mod">
+        <pc:chgData name="Colin" userId="c2c872a862d4dd17" providerId="LiveId" clId="{DBF0D679-A1D2-41BA-9DE5-196B1668C167}" dt="2020-07-20T02:05:04.484" v="2784" actId="20577"/>
+        <pc:sldMkLst>
+          <pc:docMk/>
+          <pc:sldMk cId="0" sldId="274"/>
+        </pc:sldMkLst>
+        <pc:spChg chg="mod">
+          <ac:chgData name="Colin" userId="c2c872a862d4dd17" providerId="LiveId" clId="{DBF0D679-A1D2-41BA-9DE5-196B1668C167}" dt="2020-07-20T02:05:04.484" v="2784" actId="20577"/>
+          <ac:spMkLst>
+            <pc:docMk/>
+            <pc:sldMk cId="0" sldId="274"/>
+            <ac:spMk id="181" creationId="{00000000-0000-0000-0000-000000000000}"/>
           </ac:spMkLst>
         </pc:spChg>
       </pc:sldChg>
@@ -10897,8 +10927,8 @@
               </a:spcAft>
               <a:buNone/>
             </a:pPr>
-            <a:br>
-              <a:rPr lang="en" sz="1700">
+            <a:r>
+              <a:rPr lang="en-US" sz="1700" dirty="0">
                 <a:solidFill>
                   <a:srgbClr val="FFFFFF"/>
                 </a:solidFill>
@@ -10907,9 +10937,41 @@
                 <a:cs typeface="Lato"/>
                 <a:sym typeface="Lato"/>
               </a:rPr>
-            </a:br>
+              <a:t>The creation of our webapp can be summarized into four parts:</a:t>
+            </a:r>
+          </a:p>
+          <a:p>
+            <a:pPr marL="0" lvl="0" indent="0" algn="l" rtl="0">
+              <a:spcBef>
+                <a:spcPts val="0"/>
+              </a:spcBef>
+              <a:spcAft>
+                <a:spcPts val="0"/>
+              </a:spcAft>
+              <a:buNone/>
+            </a:pPr>
+            <a:endParaRPr lang="en-US" sz="1700" dirty="0">
+              <a:solidFill>
+                <a:srgbClr val="FFFFFF"/>
+              </a:solidFill>
+              <a:latin typeface="Lato"/>
+              <a:ea typeface="Lato"/>
+              <a:cs typeface="Lato"/>
+              <a:sym typeface="Lato"/>
+            </a:endParaRPr>
+          </a:p>
+          <a:p>
+            <a:pPr marL="0" lvl="0" indent="0" algn="l" rtl="0">
+              <a:spcBef>
+                <a:spcPts val="0"/>
+              </a:spcBef>
+              <a:spcAft>
+                <a:spcPts val="0"/>
+              </a:spcAft>
+              <a:buNone/>
+            </a:pPr>
             <a:r>
-              <a:rPr lang="en" sz="1700">
+              <a:rPr lang="en-US" sz="1700" dirty="0">
                 <a:solidFill>
                   <a:srgbClr val="FFFFFF"/>
                 </a:solidFill>
@@ -10918,9 +10980,149 @@
                 <a:cs typeface="Lato"/>
                 <a:sym typeface="Lato"/>
               </a:rPr>
-              <a:t>Blah blah</a:t>
+              <a:t>We acquired the data and stored it in SQL.</a:t>
             </a:r>
-            <a:endParaRPr sz="1700">
+          </a:p>
+          <a:p>
+            <a:pPr marL="0" lvl="0" indent="0" algn="l" rtl="0">
+              <a:spcBef>
+                <a:spcPts val="0"/>
+              </a:spcBef>
+              <a:spcAft>
+                <a:spcPts val="0"/>
+              </a:spcAft>
+              <a:buNone/>
+            </a:pPr>
+            <a:endParaRPr lang="en-US" sz="1700" dirty="0">
+              <a:solidFill>
+                <a:srgbClr val="FFFFFF"/>
+              </a:solidFill>
+              <a:latin typeface="Lato"/>
+              <a:ea typeface="Lato"/>
+              <a:cs typeface="Lato"/>
+              <a:sym typeface="Lato"/>
+            </a:endParaRPr>
+          </a:p>
+          <a:p>
+            <a:pPr marL="0" lvl="0" indent="0" algn="l" rtl="0">
+              <a:spcBef>
+                <a:spcPts val="0"/>
+              </a:spcBef>
+              <a:spcAft>
+                <a:spcPts val="0"/>
+              </a:spcAft>
+              <a:buNone/>
+            </a:pPr>
+            <a:r>
+              <a:rPr lang="en-US" sz="1700" dirty="0">
+                <a:solidFill>
+                  <a:srgbClr val="FFFFFF"/>
+                </a:solidFill>
+                <a:latin typeface="Lato"/>
+                <a:ea typeface="Lato"/>
+                <a:cs typeface="Lato"/>
+                <a:sym typeface="Lato"/>
+              </a:rPr>
+              <a:t>We scripted functionality &amp; design for the site in HTML and CSS.</a:t>
+            </a:r>
+          </a:p>
+          <a:p>
+            <a:pPr marL="0" lvl="0" indent="0" algn="l" rtl="0">
+              <a:spcBef>
+                <a:spcPts val="0"/>
+              </a:spcBef>
+              <a:spcAft>
+                <a:spcPts val="0"/>
+              </a:spcAft>
+              <a:buNone/>
+            </a:pPr>
+            <a:endParaRPr lang="en-US" sz="1700" dirty="0">
+              <a:solidFill>
+                <a:srgbClr val="FFFFFF"/>
+              </a:solidFill>
+              <a:latin typeface="Lato"/>
+              <a:ea typeface="Lato"/>
+              <a:cs typeface="Lato"/>
+              <a:sym typeface="Lato"/>
+            </a:endParaRPr>
+          </a:p>
+          <a:p>
+            <a:pPr marL="0" lvl="0" indent="0" algn="l" rtl="0">
+              <a:spcBef>
+                <a:spcPts val="0"/>
+              </a:spcBef>
+              <a:spcAft>
+                <a:spcPts val="0"/>
+              </a:spcAft>
+              <a:buNone/>
+            </a:pPr>
+            <a:r>
+              <a:rPr lang="en-US" sz="1700" dirty="0">
+                <a:solidFill>
+                  <a:srgbClr val="FFFFFF"/>
+                </a:solidFill>
+                <a:latin typeface="Lato"/>
+                <a:ea typeface="Lato"/>
+                <a:cs typeface="Lato"/>
+                <a:sym typeface="Lato"/>
+              </a:rPr>
+              <a:t>We enabled the site to pull from the APIs and our database using JavaScript.</a:t>
+            </a:r>
+          </a:p>
+          <a:p>
+            <a:pPr marL="0" lvl="0" indent="0" algn="l" rtl="0">
+              <a:spcBef>
+                <a:spcPts val="0"/>
+              </a:spcBef>
+              <a:spcAft>
+                <a:spcPts val="0"/>
+              </a:spcAft>
+              <a:buNone/>
+            </a:pPr>
+            <a:endParaRPr lang="en-US" sz="1700" dirty="0">
+              <a:solidFill>
+                <a:srgbClr val="FFFFFF"/>
+              </a:solidFill>
+              <a:latin typeface="Lato"/>
+              <a:ea typeface="Lato"/>
+              <a:cs typeface="Lato"/>
+              <a:sym typeface="Lato"/>
+            </a:endParaRPr>
+          </a:p>
+          <a:p>
+            <a:pPr marL="0" lvl="0" indent="0" algn="l" rtl="0">
+              <a:spcBef>
+                <a:spcPts val="0"/>
+              </a:spcBef>
+              <a:spcAft>
+                <a:spcPts val="0"/>
+              </a:spcAft>
+              <a:buNone/>
+            </a:pPr>
+            <a:r>
+              <a:rPr lang="en-US" sz="1700" dirty="0">
+                <a:solidFill>
+                  <a:srgbClr val="FFFFFF"/>
+                </a:solidFill>
+                <a:latin typeface="Lato"/>
+                <a:ea typeface="Lato"/>
+                <a:cs typeface="Lato"/>
+                <a:sym typeface="Lato"/>
+              </a:rPr>
+              <a:t>Finally, we mapped the locations &amp; created the summary statistics in JavaScript.</a:t>
+            </a:r>
+          </a:p>
+          <a:p>
+            <a:pPr marL="0" lvl="0" indent="0" algn="l" rtl="0">
+              <a:spcBef>
+                <a:spcPts val="0"/>
+              </a:spcBef>
+              <a:spcAft>
+                <a:spcPts val="0"/>
+              </a:spcAft>
+              <a:buNone/>
+            </a:pPr>
+            <a:endParaRPr sz="1700" dirty="0">
               <a:solidFill>
                 <a:srgbClr val="FFFFFF"/>
               </a:solidFill>

</xml_diff>

<commit_message>
added post mortem to PPT
</commit_message>
<xml_diff>
--- a/Homies City Collection.pptx
+++ b/Homies City Collection.pptx
@@ -308,7 +308,7 @@
   <pc:docChgLst>
     <pc:chgData name="Colin" userId="c2c872a862d4dd17" providerId="LiveId" clId="{DBF0D679-A1D2-41BA-9DE5-196B1668C167}"/>
     <pc:docChg chg="undo custSel addSld delSld modSld sldOrd">
-      <pc:chgData name="Colin" userId="c2c872a862d4dd17" providerId="LiveId" clId="{DBF0D679-A1D2-41BA-9DE5-196B1668C167}" dt="2020-07-21T00:03:47.210" v="2929" actId="20577"/>
+      <pc:chgData name="Colin" userId="c2c872a862d4dd17" providerId="LiveId" clId="{DBF0D679-A1D2-41BA-9DE5-196B1668C167}" dt="2020-07-21T00:26:23.412" v="4822" actId="20577"/>
       <pc:docMkLst>
         <pc:docMk/>
       </pc:docMkLst>
@@ -456,13 +456,13 @@
         </pc:spChg>
       </pc:sldChg>
       <pc:sldChg chg="modSp mod">
-        <pc:chgData name="Colin" userId="c2c872a862d4dd17" providerId="LiveId" clId="{DBF0D679-A1D2-41BA-9DE5-196B1668C167}" dt="2020-07-20T02:05:04.484" v="2784" actId="20577"/>
+        <pc:chgData name="Colin" userId="c2c872a862d4dd17" providerId="LiveId" clId="{DBF0D679-A1D2-41BA-9DE5-196B1668C167}" dt="2020-07-21T00:26:23.412" v="4822" actId="20577"/>
         <pc:sldMkLst>
           <pc:docMk/>
           <pc:sldMk cId="0" sldId="274"/>
         </pc:sldMkLst>
         <pc:spChg chg="mod">
-          <ac:chgData name="Colin" userId="c2c872a862d4dd17" providerId="LiveId" clId="{DBF0D679-A1D2-41BA-9DE5-196B1668C167}" dt="2020-07-20T02:05:04.484" v="2784" actId="20577"/>
+          <ac:chgData name="Colin" userId="c2c872a862d4dd17" providerId="LiveId" clId="{DBF0D679-A1D2-41BA-9DE5-196B1668C167}" dt="2020-07-21T00:26:23.412" v="4822" actId="20577"/>
           <ac:spMkLst>
             <pc:docMk/>
             <pc:sldMk cId="0" sldId="274"/>
@@ -11438,8 +11438,8 @@
         </p:nvSpPr>
         <p:spPr>
           <a:xfrm>
-            <a:off x="303300" y="1819625"/>
-            <a:ext cx="8520600" cy="2899200"/>
+            <a:off x="311700" y="1122150"/>
+            <a:ext cx="8520600" cy="2999794"/>
           </a:xfrm>
           <a:prstGeom prst="rect">
             <a:avLst/>
@@ -11464,8 +11464,8 @@
               </a:spcAft>
               <a:buNone/>
             </a:pPr>
-            <a:br>
-              <a:rPr lang="en" sz="1700">
+            <a:r>
+              <a:rPr lang="en-US" sz="1700" dirty="0">
                 <a:solidFill>
                   <a:srgbClr val="FFFFFF"/>
                 </a:solidFill>
@@ -11474,9 +11474,32 @@
                 <a:cs typeface="Lato"/>
                 <a:sym typeface="Lato"/>
               </a:rPr>
-            </a:br>
+              <a:t>While we were successful in the JavaScript portion of the project, it took longer than anticipated.</a:t>
+            </a:r>
+          </a:p>
+          <a:p>
+            <a:pPr marL="0" lvl="0" indent="0" algn="l" rtl="0">
+              <a:spcBef>
+                <a:spcPts val="0"/>
+              </a:spcBef>
+              <a:spcAft>
+                <a:spcPts val="0"/>
+              </a:spcAft>
+              <a:buNone/>
+            </a:pPr>
+            <a:endParaRPr lang="en-US" sz="1700" dirty="0">
+              <a:solidFill>
+                <a:srgbClr val="FFFFFF"/>
+              </a:solidFill>
+              <a:latin typeface="Lato"/>
+              <a:ea typeface="Lato"/>
+              <a:cs typeface="Lato"/>
+              <a:sym typeface="Lato"/>
+            </a:endParaRPr>
+          </a:p>
+          <a:p>
             <a:r>
-              <a:rPr lang="en" sz="1700">
+              <a:rPr lang="en-US" sz="1700" dirty="0">
                 <a:solidFill>
                   <a:srgbClr val="FFFFFF"/>
                 </a:solidFill>
@@ -11485,9 +11508,274 @@
                 <a:cs typeface="Lato"/>
                 <a:sym typeface="Lato"/>
               </a:rPr>
-              <a:t>Blah blah</a:t>
+              <a:t>We learned how to implement the library </a:t>
             </a:r>
-            <a:endParaRPr sz="1700">
+            <a:r>
+              <a:rPr lang="en-US" sz="1700" dirty="0" err="1">
+                <a:solidFill>
+                  <a:srgbClr val="FFFFFF"/>
+                </a:solidFill>
+                <a:latin typeface="Lato"/>
+                <a:ea typeface="Lato"/>
+                <a:cs typeface="Lato"/>
+                <a:sym typeface="Lato"/>
+              </a:rPr>
+              <a:t>Axios</a:t>
+            </a:r>
+            <a:r>
+              <a:rPr lang="en-US" sz="1700" dirty="0">
+                <a:solidFill>
+                  <a:srgbClr val="FFFFFF"/>
+                </a:solidFill>
+                <a:latin typeface="Lato"/>
+                <a:ea typeface="Lato"/>
+                <a:cs typeface="Lato"/>
+                <a:sym typeface="Lato"/>
+              </a:rPr>
+              <a:t>, which is an incredibly powerful and useful asset to have when working with APIs.</a:t>
+            </a:r>
+          </a:p>
+          <a:p>
+            <a:pPr marL="0" lvl="0" indent="0" algn="l" rtl="0">
+              <a:spcBef>
+                <a:spcPts val="0"/>
+              </a:spcBef>
+              <a:spcAft>
+                <a:spcPts val="0"/>
+              </a:spcAft>
+              <a:buNone/>
+            </a:pPr>
+            <a:endParaRPr lang="en-US" sz="1700" dirty="0">
+              <a:solidFill>
+                <a:srgbClr val="FFFFFF"/>
+              </a:solidFill>
+              <a:latin typeface="Lato"/>
+              <a:ea typeface="Lato"/>
+              <a:cs typeface="Lato"/>
+              <a:sym typeface="Lato"/>
+            </a:endParaRPr>
+          </a:p>
+          <a:p>
+            <a:pPr marL="0" lvl="0" indent="0" algn="l" rtl="0">
+              <a:spcBef>
+                <a:spcPts val="0"/>
+              </a:spcBef>
+              <a:spcAft>
+                <a:spcPts val="0"/>
+              </a:spcAft>
+              <a:buNone/>
+            </a:pPr>
+            <a:r>
+              <a:rPr lang="en-US" sz="1700" dirty="0">
+                <a:solidFill>
+                  <a:srgbClr val="FFFFFF"/>
+                </a:solidFill>
+                <a:latin typeface="Lato"/>
+                <a:ea typeface="Lato"/>
+                <a:cs typeface="Lato"/>
+                <a:sym typeface="Lato"/>
+              </a:rPr>
+              <a:t>There are additional things we would have included, such as more measurements for the cities, better map integration, and overall improved usability. Due to time constraints, </a:t>
+            </a:r>
+            <a:r>
+              <a:rPr lang="en-US" sz="1700">
+                <a:solidFill>
+                  <a:srgbClr val="FFFFFF"/>
+                </a:solidFill>
+                <a:latin typeface="Lato"/>
+                <a:ea typeface="Lato"/>
+                <a:cs typeface="Lato"/>
+                <a:sym typeface="Lato"/>
+              </a:rPr>
+              <a:t>we did what </a:t>
+            </a:r>
+            <a:r>
+              <a:rPr lang="en-US" sz="1700" dirty="0">
+                <a:solidFill>
+                  <a:srgbClr val="FFFFFF"/>
+                </a:solidFill>
+                <a:latin typeface="Lato"/>
+                <a:ea typeface="Lato"/>
+                <a:cs typeface="Lato"/>
+                <a:sym typeface="Lato"/>
+              </a:rPr>
+              <a:t>was most important.</a:t>
+            </a:r>
+          </a:p>
+          <a:p>
+            <a:pPr marL="0" lvl="0" indent="0" algn="l" rtl="0">
+              <a:spcBef>
+                <a:spcPts val="0"/>
+              </a:spcBef>
+              <a:spcAft>
+                <a:spcPts val="0"/>
+              </a:spcAft>
+              <a:buNone/>
+            </a:pPr>
+            <a:endParaRPr lang="en-US" sz="1700" dirty="0">
+              <a:solidFill>
+                <a:srgbClr val="FFFFFF"/>
+              </a:solidFill>
+              <a:latin typeface="Lato"/>
+              <a:ea typeface="Lato"/>
+              <a:cs typeface="Lato"/>
+              <a:sym typeface="Lato"/>
+            </a:endParaRPr>
+          </a:p>
+          <a:p>
+            <a:pPr marL="0" lvl="0" indent="0" algn="ctr" rtl="0">
+              <a:spcBef>
+                <a:spcPts val="0"/>
+              </a:spcBef>
+              <a:spcAft>
+                <a:spcPts val="0"/>
+              </a:spcAft>
+              <a:buNone/>
+            </a:pPr>
+            <a:r>
+              <a:rPr lang="en-US" sz="1700" dirty="0">
+                <a:solidFill>
+                  <a:srgbClr val="FFFFFF"/>
+                </a:solidFill>
+                <a:latin typeface="Lato"/>
+                <a:ea typeface="Lato"/>
+                <a:cs typeface="Lato"/>
+                <a:sym typeface="Lato"/>
+              </a:rPr>
+              <a:t>Thank you!</a:t>
+            </a:r>
+          </a:p>
+          <a:p>
+            <a:pPr marL="0" lvl="0" indent="0" algn="l" rtl="0">
+              <a:spcBef>
+                <a:spcPts val="0"/>
+              </a:spcBef>
+              <a:spcAft>
+                <a:spcPts val="0"/>
+              </a:spcAft>
+              <a:buNone/>
+            </a:pPr>
+            <a:endParaRPr lang="en-US" sz="1700" dirty="0">
+              <a:solidFill>
+                <a:srgbClr val="FFFFFF"/>
+              </a:solidFill>
+              <a:latin typeface="Lato"/>
+              <a:ea typeface="Lato"/>
+              <a:cs typeface="Lato"/>
+              <a:sym typeface="Lato"/>
+            </a:endParaRPr>
+          </a:p>
+          <a:p>
+            <a:pPr marL="0" lvl="0" indent="0" algn="l" rtl="0">
+              <a:spcBef>
+                <a:spcPts val="0"/>
+              </a:spcBef>
+              <a:spcAft>
+                <a:spcPts val="0"/>
+              </a:spcAft>
+              <a:buNone/>
+            </a:pPr>
+            <a:endParaRPr lang="en-US" sz="1700" dirty="0">
+              <a:solidFill>
+                <a:srgbClr val="FFFFFF"/>
+              </a:solidFill>
+              <a:latin typeface="Lato"/>
+              <a:ea typeface="Lato"/>
+              <a:cs typeface="Lato"/>
+              <a:sym typeface="Lato"/>
+            </a:endParaRPr>
+          </a:p>
+          <a:p>
+            <a:pPr marL="0" lvl="0" indent="0" algn="l" rtl="0">
+              <a:spcBef>
+                <a:spcPts val="0"/>
+              </a:spcBef>
+              <a:spcAft>
+                <a:spcPts val="0"/>
+              </a:spcAft>
+              <a:buNone/>
+            </a:pPr>
+            <a:endParaRPr lang="en-US" sz="1700" dirty="0">
+              <a:solidFill>
+                <a:srgbClr val="FFFFFF"/>
+              </a:solidFill>
+              <a:latin typeface="Lato"/>
+              <a:ea typeface="Lato"/>
+              <a:cs typeface="Lato"/>
+              <a:sym typeface="Lato"/>
+            </a:endParaRPr>
+          </a:p>
+          <a:p>
+            <a:pPr marL="0" lvl="0" indent="0" algn="l" rtl="0">
+              <a:spcBef>
+                <a:spcPts val="0"/>
+              </a:spcBef>
+              <a:spcAft>
+                <a:spcPts val="0"/>
+              </a:spcAft>
+              <a:buNone/>
+            </a:pPr>
+            <a:endParaRPr lang="en-US" sz="1700" dirty="0">
+              <a:solidFill>
+                <a:srgbClr val="FFFFFF"/>
+              </a:solidFill>
+              <a:latin typeface="Lato"/>
+              <a:ea typeface="Lato"/>
+              <a:cs typeface="Lato"/>
+              <a:sym typeface="Lato"/>
+            </a:endParaRPr>
+          </a:p>
+          <a:p>
+            <a:pPr marL="0" lvl="0" indent="0" algn="l" rtl="0">
+              <a:spcBef>
+                <a:spcPts val="0"/>
+              </a:spcBef>
+              <a:spcAft>
+                <a:spcPts val="0"/>
+              </a:spcAft>
+              <a:buNone/>
+            </a:pPr>
+            <a:endParaRPr lang="en-US" sz="1700" dirty="0">
+              <a:solidFill>
+                <a:srgbClr val="FFFFFF"/>
+              </a:solidFill>
+              <a:latin typeface="Lato"/>
+              <a:ea typeface="Lato"/>
+              <a:cs typeface="Lato"/>
+              <a:sym typeface="Lato"/>
+            </a:endParaRPr>
+          </a:p>
+          <a:p>
+            <a:pPr marL="0" lvl="0" indent="0" algn="l" rtl="0">
+              <a:spcBef>
+                <a:spcPts val="0"/>
+              </a:spcBef>
+              <a:spcAft>
+                <a:spcPts val="0"/>
+              </a:spcAft>
+              <a:buNone/>
+            </a:pPr>
+            <a:endParaRPr lang="en-US" sz="1700" dirty="0">
+              <a:solidFill>
+                <a:srgbClr val="FFFFFF"/>
+              </a:solidFill>
+              <a:latin typeface="Lato"/>
+              <a:ea typeface="Lato"/>
+              <a:cs typeface="Lato"/>
+              <a:sym typeface="Lato"/>
+            </a:endParaRPr>
+          </a:p>
+          <a:p>
+            <a:pPr marL="0" lvl="0" indent="0" algn="l" rtl="0">
+              <a:spcBef>
+                <a:spcPts val="0"/>
+              </a:spcBef>
+              <a:spcAft>
+                <a:spcPts val="0"/>
+              </a:spcAft>
+              <a:buNone/>
+            </a:pPr>
+            <a:endParaRPr lang="en-US" sz="1700" dirty="0">
               <a:solidFill>
                 <a:srgbClr val="FFFFFF"/>
               </a:solidFill>

</xml_diff>